<commit_message>
add some new cmd
</commit_message>
<xml_diff>
--- a/linux/linux_cmd.pptx
+++ b/linux/linux_cmd.pptx
@@ -10,16 +10,27 @@
     <p:sldMasterId id="2147483737" r:id="rId6"/>
   </p:sldMasterIdLst>
   <p:notesMasterIdLst>
-    <p:notesMasterId r:id="rId14"/>
+    <p:notesMasterId r:id="rId25"/>
   </p:notesMasterIdLst>
   <p:sldIdLst>
     <p:sldId id="286" r:id="rId7"/>
     <p:sldId id="341" r:id="rId8"/>
-    <p:sldId id="368" r:id="rId9"/>
-    <p:sldId id="369" r:id="rId10"/>
-    <p:sldId id="370" r:id="rId11"/>
+    <p:sldId id="370" r:id="rId9"/>
+    <p:sldId id="368" r:id="rId10"/>
+    <p:sldId id="369" r:id="rId11"/>
     <p:sldId id="371" r:id="rId12"/>
-    <p:sldId id="325" r:id="rId13"/>
+    <p:sldId id="372" r:id="rId13"/>
+    <p:sldId id="373" r:id="rId14"/>
+    <p:sldId id="374" r:id="rId15"/>
+    <p:sldId id="375" r:id="rId16"/>
+    <p:sldId id="376" r:id="rId17"/>
+    <p:sldId id="377" r:id="rId18"/>
+    <p:sldId id="378" r:id="rId19"/>
+    <p:sldId id="379" r:id="rId20"/>
+    <p:sldId id="380" r:id="rId21"/>
+    <p:sldId id="381" r:id="rId22"/>
+    <p:sldId id="382" r:id="rId23"/>
+    <p:sldId id="325" r:id="rId24"/>
   </p:sldIdLst>
   <p:sldSz cx="9144000" cy="6858000" type="screen4x3"/>
   <p:notesSz cx="6858000" cy="9144000"/>
@@ -220,7 +231,7 @@
             <a:fld id="{1D1B987F-03B8-4DD3-B82B-E020EAD409CF}" type="datetimeFigureOut">
               <a:rPr lang="en-US" smtClean="0"/>
               <a:pPr/>
-              <a:t>6/23/2017</a:t>
+              <a:t>6/29/2017</a:t>
             </a:fld>
             <a:endParaRPr lang="en-US"/>
           </a:p>
@@ -994,7 +1005,7 @@
             <a:fld id="{CA0C6ED6-D0B9-4DC5-B1AE-C5D4014C8E49}" type="datetimeFigureOut">
               <a:rPr lang="en-US" smtClean="0"/>
               <a:pPr/>
-              <a:t>6/23/2017</a:t>
+              <a:t>6/29/2017</a:t>
             </a:fld>
             <a:endParaRPr lang="en-US"/>
           </a:p>
@@ -1200,7 +1211,7 @@
             <a:fld id="{CA0C6ED6-D0B9-4DC5-B1AE-C5D4014C8E49}" type="datetimeFigureOut">
               <a:rPr lang="en-US" smtClean="0"/>
               <a:pPr/>
-              <a:t>6/23/2017</a:t>
+              <a:t>6/29/2017</a:t>
             </a:fld>
             <a:endParaRPr lang="en-US"/>
           </a:p>
@@ -1853,7 +1864,7 @@
             <a:fld id="{0C77BFF5-5A0A-BB4B-8F6E-6841FAB046BE}" type="datetime1">
               <a:rPr lang="sv-SE" smtClean="0"/>
               <a:pPr/>
-              <a:t>2017-06-23</a:t>
+              <a:t>2017-06-29</a:t>
             </a:fld>
             <a:endParaRPr lang="en-US" dirty="0"/>
           </a:p>
@@ -2088,7 +2099,7 @@
             <a:fld id="{E41408AA-8272-574B-9552-0B998EC66E8E}" type="datetime1">
               <a:rPr lang="sv-SE" smtClean="0"/>
               <a:pPr/>
-              <a:t>2017-06-23</a:t>
+              <a:t>2017-06-29</a:t>
             </a:fld>
             <a:endParaRPr lang="en-US" dirty="0"/>
           </a:p>
@@ -2399,7 +2410,7 @@
             <a:fld id="{953A9D4A-E8FA-104F-802A-4562FEF196FD}" type="datetime1">
               <a:rPr lang="sv-SE" smtClean="0"/>
               <a:pPr/>
-              <a:t>2017-06-23</a:t>
+              <a:t>2017-06-29</a:t>
             </a:fld>
             <a:endParaRPr lang="en-US" dirty="0"/>
           </a:p>
@@ -2752,7 +2763,7 @@
             <a:fld id="{953A9D4A-E8FA-104F-802A-4562FEF196FD}" type="datetime1">
               <a:rPr lang="sv-SE" smtClean="0"/>
               <a:pPr/>
-              <a:t>2017-06-23</a:t>
+              <a:t>2017-06-29</a:t>
             </a:fld>
             <a:endParaRPr lang="en-US" dirty="0"/>
           </a:p>
@@ -3239,7 +3250,7 @@
             <a:fld id="{953A9D4A-E8FA-104F-802A-4562FEF196FD}" type="datetime1">
               <a:rPr lang="sv-SE" smtClean="0"/>
               <a:pPr/>
-              <a:t>2017-06-23</a:t>
+              <a:t>2017-06-29</a:t>
             </a:fld>
             <a:endParaRPr lang="en-US" dirty="0"/>
           </a:p>
@@ -3422,7 +3433,7 @@
             <a:fld id="{953A9D4A-E8FA-104F-802A-4562FEF196FD}" type="datetime1">
               <a:rPr lang="sv-SE" smtClean="0"/>
               <a:pPr/>
-              <a:t>2017-06-23</a:t>
+              <a:t>2017-06-29</a:t>
             </a:fld>
             <a:endParaRPr lang="en-US" dirty="0"/>
           </a:p>
@@ -3582,7 +3593,7 @@
             <a:fld id="{953A9D4A-E8FA-104F-802A-4562FEF196FD}" type="datetime1">
               <a:rPr lang="sv-SE" smtClean="0"/>
               <a:pPr/>
-              <a:t>2017-06-23</a:t>
+              <a:t>2017-06-29</a:t>
             </a:fld>
             <a:endParaRPr lang="en-US" dirty="0"/>
           </a:p>
@@ -3834,7 +3845,7 @@
             <a:fld id="{CA0C6ED6-D0B9-4DC5-B1AE-C5D4014C8E49}" type="datetimeFigureOut">
               <a:rPr lang="en-US" smtClean="0"/>
               <a:pPr/>
-              <a:t>6/23/2017</a:t>
+              <a:t>6/29/2017</a:t>
             </a:fld>
             <a:endParaRPr lang="en-US"/>
           </a:p>
@@ -4152,7 +4163,7 @@
             <a:fld id="{953A9D4A-E8FA-104F-802A-4562FEF196FD}" type="datetime1">
               <a:rPr lang="sv-SE" smtClean="0"/>
               <a:pPr/>
-              <a:t>2017-06-23</a:t>
+              <a:t>2017-06-29</a:t>
             </a:fld>
             <a:endParaRPr lang="en-US" dirty="0"/>
           </a:p>
@@ -4474,7 +4485,7 @@
             <a:fld id="{953A9D4A-E8FA-104F-802A-4562FEF196FD}" type="datetime1">
               <a:rPr lang="sv-SE" smtClean="0"/>
               <a:pPr/>
-              <a:t>2017-06-23</a:t>
+              <a:t>2017-06-29</a:t>
             </a:fld>
             <a:endParaRPr lang="en-US" dirty="0"/>
           </a:p>
@@ -4709,7 +4720,7 @@
             <a:fld id="{953A9D4A-E8FA-104F-802A-4562FEF196FD}" type="datetime1">
               <a:rPr lang="sv-SE" smtClean="0"/>
               <a:pPr/>
-              <a:t>2017-06-23</a:t>
+              <a:t>2017-06-29</a:t>
             </a:fld>
             <a:endParaRPr lang="en-US" dirty="0"/>
           </a:p>
@@ -4954,7 +4965,7 @@
             <a:fld id="{953A9D4A-E8FA-104F-802A-4562FEF196FD}" type="datetime1">
               <a:rPr lang="sv-SE" smtClean="0"/>
               <a:pPr/>
-              <a:t>2017-06-23</a:t>
+              <a:t>2017-06-29</a:t>
             </a:fld>
             <a:endParaRPr lang="en-US" dirty="0"/>
           </a:p>
@@ -5561,14 +5572,14 @@
           <a:effectLst/>
           <a:extLst>
             <a:ext uri="{909E8E84-426E-40dd-AFC4-6F175D3DCCD1}">
-              <a14:hiddenFill xmlns="" xmlns:a14="http://schemas.microsoft.com/office/drawing/2010/main">
+              <a14:hiddenFill xmlns:a14="http://schemas.microsoft.com/office/drawing/2010/main" xmlns="">
                 <a:solidFill>
                   <a:schemeClr val="accent1"/>
                 </a:solidFill>
               </a14:hiddenFill>
             </a:ext>
             <a:ext uri="{91240B29-F687-4f45-9708-019B960494DF}">
-              <a14:hiddenLine xmlns="" xmlns:a14="http://schemas.microsoft.com/office/drawing/2010/main" w="9525">
+              <a14:hiddenLine xmlns:a14="http://schemas.microsoft.com/office/drawing/2010/main" xmlns="" w="9525">
                 <a:solidFill>
                   <a:schemeClr val="tx1"/>
                 </a:solidFill>
@@ -5578,7 +5589,7 @@
               </a14:hiddenLine>
             </a:ext>
             <a:ext uri="{AF507438-7753-43e0-B8FC-AC1667EBCBE1}">
-              <a14:hiddenEffects xmlns="" xmlns:a14="http://schemas.microsoft.com/office/drawing/2010/main">
+              <a14:hiddenEffects xmlns:a14="http://schemas.microsoft.com/office/drawing/2010/main" xmlns="">
                 <a:effectLst>
                   <a:outerShdw blurRad="63500" dist="38099" dir="2700000" algn="ctr" rotWithShape="0">
                     <a:schemeClr val="bg2">
@@ -5756,7 +5767,7 @@
             <a:fld id="{CA0C6ED6-D0B9-4DC5-B1AE-C5D4014C8E49}" type="datetimeFigureOut">
               <a:rPr lang="en-US" smtClean="0"/>
               <a:pPr/>
-              <a:t>6/23/2017</a:t>
+              <a:t>6/29/2017</a:t>
             </a:fld>
             <a:endParaRPr lang="en-US"/>
           </a:p>
@@ -6097,7 +6108,7 @@
             <a:fld id="{CA0C6ED6-D0B9-4DC5-B1AE-C5D4014C8E49}" type="datetimeFigureOut">
               <a:rPr lang="en-US" smtClean="0"/>
               <a:pPr/>
-              <a:t>6/23/2017</a:t>
+              <a:t>6/29/2017</a:t>
             </a:fld>
             <a:endParaRPr lang="en-US"/>
           </a:p>
@@ -6447,7 +6458,7 @@
             <a:fld id="{CA0C6ED6-D0B9-4DC5-B1AE-C5D4014C8E49}" type="datetimeFigureOut">
               <a:rPr lang="en-US" smtClean="0"/>
               <a:pPr/>
-              <a:t>6/23/2017</a:t>
+              <a:t>6/29/2017</a:t>
             </a:fld>
             <a:endParaRPr lang="en-US"/>
           </a:p>
@@ -6945,7 +6956,7 @@
             <a:fld id="{CA0C6ED6-D0B9-4DC5-B1AE-C5D4014C8E49}" type="datetimeFigureOut">
               <a:rPr lang="en-US" smtClean="0"/>
               <a:pPr/>
-              <a:t>6/23/2017</a:t>
+              <a:t>6/29/2017</a:t>
             </a:fld>
             <a:endParaRPr lang="en-US"/>
           </a:p>
@@ -7219,7 +7230,7 @@
             <a:fld id="{CA0C6ED6-D0B9-4DC5-B1AE-C5D4014C8E49}" type="datetimeFigureOut">
               <a:rPr lang="en-US" smtClean="0"/>
               <a:pPr/>
-              <a:t>6/23/2017</a:t>
+              <a:t>6/29/2017</a:t>
             </a:fld>
             <a:endParaRPr lang="en-US"/>
           </a:p>
@@ -7363,7 +7374,7 @@
             <a:fld id="{CA0C6ED6-D0B9-4DC5-B1AE-C5D4014C8E49}" type="datetimeFigureOut">
               <a:rPr lang="en-US" smtClean="0"/>
               <a:pPr/>
-              <a:t>6/23/2017</a:t>
+              <a:t>6/29/2017</a:t>
             </a:fld>
             <a:endParaRPr lang="en-US"/>
           </a:p>
@@ -7484,7 +7495,7 @@
             <a:fld id="{CA0C6ED6-D0B9-4DC5-B1AE-C5D4014C8E49}" type="datetimeFigureOut">
               <a:rPr lang="en-US" smtClean="0"/>
               <a:pPr/>
-              <a:t>6/23/2017</a:t>
+              <a:t>6/29/2017</a:t>
             </a:fld>
             <a:endParaRPr lang="en-US"/>
           </a:p>
@@ -7803,7 +7814,7 @@
             <a:fld id="{CA0C6ED6-D0B9-4DC5-B1AE-C5D4014C8E49}" type="datetimeFigureOut">
               <a:rPr lang="en-US" smtClean="0"/>
               <a:pPr/>
-              <a:t>6/23/2017</a:t>
+              <a:t>6/29/2017</a:t>
             </a:fld>
             <a:endParaRPr lang="en-US"/>
           </a:p>
@@ -8096,7 +8107,7 @@
             <a:fld id="{CA0C6ED6-D0B9-4DC5-B1AE-C5D4014C8E49}" type="datetimeFigureOut">
               <a:rPr lang="en-US" smtClean="0"/>
               <a:pPr/>
-              <a:t>6/23/2017</a:t>
+              <a:t>6/29/2017</a:t>
             </a:fld>
             <a:endParaRPr lang="en-US"/>
           </a:p>
@@ -8308,7 +8319,7 @@
             <a:fld id="{CA0C6ED6-D0B9-4DC5-B1AE-C5D4014C8E49}" type="datetimeFigureOut">
               <a:rPr lang="en-US" smtClean="0"/>
               <a:pPr/>
-              <a:t>6/23/2017</a:t>
+              <a:t>6/29/2017</a:t>
             </a:fld>
             <a:endParaRPr lang="en-US"/>
           </a:p>
@@ -8517,7 +8528,7 @@
             <a:fld id="{CA0C6ED6-D0B9-4DC5-B1AE-C5D4014C8E49}" type="datetimeFigureOut">
               <a:rPr lang="en-US" smtClean="0"/>
               <a:pPr/>
-              <a:t>6/23/2017</a:t>
+              <a:t>6/29/2017</a:t>
             </a:fld>
             <a:endParaRPr lang="en-US"/>
           </a:p>
@@ -9096,14 +9107,14 @@
           <a:effectLst/>
           <a:extLst>
             <a:ext uri="{909E8E84-426E-40dd-AFC4-6F175D3DCCD1}">
-              <a14:hiddenFill xmlns="" xmlns:a14="http://schemas.microsoft.com/office/drawing/2010/main">
+              <a14:hiddenFill xmlns:a14="http://schemas.microsoft.com/office/drawing/2010/main" xmlns="">
                 <a:solidFill>
                   <a:schemeClr val="accent1"/>
                 </a:solidFill>
               </a14:hiddenFill>
             </a:ext>
             <a:ext uri="{91240B29-F687-4f45-9708-019B960494DF}">
-              <a14:hiddenLine xmlns="" xmlns:a14="http://schemas.microsoft.com/office/drawing/2010/main" w="9525">
+              <a14:hiddenLine xmlns:a14="http://schemas.microsoft.com/office/drawing/2010/main" xmlns="" w="9525">
                 <a:solidFill>
                   <a:schemeClr val="tx1"/>
                 </a:solidFill>
@@ -9113,7 +9124,7 @@
               </a14:hiddenLine>
             </a:ext>
             <a:ext uri="{AF507438-7753-43e0-B8FC-AC1667EBCBE1}">
-              <a14:hiddenEffects xmlns="" xmlns:a14="http://schemas.microsoft.com/office/drawing/2010/main">
+              <a14:hiddenEffects xmlns:a14="http://schemas.microsoft.com/office/drawing/2010/main" xmlns="">
                 <a:effectLst>
                   <a:outerShdw blurRad="63500" dist="38099" dir="2700000" algn="ctr" rotWithShape="0">
                     <a:schemeClr val="bg2">
@@ -10012,7 +10023,7 @@
             <a:fld id="{CA0C6ED6-D0B9-4DC5-B1AE-C5D4014C8E49}" type="datetimeFigureOut">
               <a:rPr lang="en-US" smtClean="0"/>
               <a:pPr/>
-              <a:t>6/23/2017</a:t>
+              <a:t>6/29/2017</a:t>
             </a:fld>
             <a:endParaRPr lang="en-US"/>
           </a:p>
@@ -12861,14 +12872,14 @@
           <a:effectLst/>
           <a:extLst>
             <a:ext uri="{909E8E84-426E-40dd-AFC4-6F175D3DCCD1}">
-              <a14:hiddenFill xmlns:a14="http://schemas.microsoft.com/office/drawing/2010/main" xmlns="">
+              <a14:hiddenFill xmlns="" xmlns:a14="http://schemas.microsoft.com/office/drawing/2010/main">
                 <a:solidFill>
                   <a:schemeClr val="accent1"/>
                 </a:solidFill>
               </a14:hiddenFill>
             </a:ext>
             <a:ext uri="{91240B29-F687-4f45-9708-019B960494DF}">
-              <a14:hiddenLine xmlns:a14="http://schemas.microsoft.com/office/drawing/2010/main" xmlns="" w="9525">
+              <a14:hiddenLine xmlns="" xmlns:a14="http://schemas.microsoft.com/office/drawing/2010/main" w="9525">
                 <a:solidFill>
                   <a:schemeClr val="tx1"/>
                 </a:solidFill>
@@ -12878,7 +12889,7 @@
               </a14:hiddenLine>
             </a:ext>
             <a:ext uri="{AF507438-7753-43e0-B8FC-AC1667EBCBE1}">
-              <a14:hiddenEffects xmlns:a14="http://schemas.microsoft.com/office/drawing/2010/main" xmlns="">
+              <a14:hiddenEffects xmlns="" xmlns:a14="http://schemas.microsoft.com/office/drawing/2010/main">
                 <a:effectLst>
                   <a:outerShdw blurRad="63500" dist="38099" dir="2700000" algn="ctr" rotWithShape="0">
                     <a:schemeClr val="bg2">
@@ -13375,7 +13386,7 @@
             <a:fld id="{CA0C6ED6-D0B9-4DC5-B1AE-C5D4014C8E49}" type="datetimeFigureOut">
               <a:rPr lang="en-US" smtClean="0"/>
               <a:pPr/>
-              <a:t>6/23/2017</a:t>
+              <a:t>6/29/2017</a:t>
             </a:fld>
             <a:endParaRPr lang="en-US"/>
           </a:p>
@@ -13532,7 +13543,7 @@
             <a:fld id="{CA0C6ED6-D0B9-4DC5-B1AE-C5D4014C8E49}" type="datetimeFigureOut">
               <a:rPr lang="en-US" smtClean="0"/>
               <a:pPr/>
-              <a:t>6/23/2017</a:t>
+              <a:t>6/29/2017</a:t>
             </a:fld>
             <a:endParaRPr lang="en-US"/>
           </a:p>
@@ -13873,7 +13884,7 @@
             <a:fld id="{CA0C6ED6-D0B9-4DC5-B1AE-C5D4014C8E49}" type="datetimeFigureOut">
               <a:rPr lang="en-US" smtClean="0"/>
               <a:pPr/>
-              <a:t>6/23/2017</a:t>
+              <a:t>6/29/2017</a:t>
             </a:fld>
             <a:endParaRPr lang="en-US"/>
           </a:p>
@@ -14223,7 +14234,7 @@
             <a:fld id="{CA0C6ED6-D0B9-4DC5-B1AE-C5D4014C8E49}" type="datetimeFigureOut">
               <a:rPr lang="en-US" smtClean="0"/>
               <a:pPr/>
-              <a:t>6/23/2017</a:t>
+              <a:t>6/29/2017</a:t>
             </a:fld>
             <a:endParaRPr lang="en-US"/>
           </a:p>
@@ -14721,7 +14732,7 @@
             <a:fld id="{CA0C6ED6-D0B9-4DC5-B1AE-C5D4014C8E49}" type="datetimeFigureOut">
               <a:rPr lang="en-US" smtClean="0"/>
               <a:pPr/>
-              <a:t>6/23/2017</a:t>
+              <a:t>6/29/2017</a:t>
             </a:fld>
             <a:endParaRPr lang="en-US"/>
           </a:p>
@@ -14865,7 +14876,7 @@
             <a:fld id="{CA0C6ED6-D0B9-4DC5-B1AE-C5D4014C8E49}" type="datetimeFigureOut">
               <a:rPr lang="en-US" smtClean="0"/>
               <a:pPr/>
-              <a:t>6/23/2017</a:t>
+              <a:t>6/29/2017</a:t>
             </a:fld>
             <a:endParaRPr lang="en-US"/>
           </a:p>
@@ -14986,7 +14997,7 @@
             <a:fld id="{CA0C6ED6-D0B9-4DC5-B1AE-C5D4014C8E49}" type="datetimeFigureOut">
               <a:rPr lang="en-US" smtClean="0"/>
               <a:pPr/>
-              <a:t>6/23/2017</a:t>
+              <a:t>6/29/2017</a:t>
             </a:fld>
             <a:endParaRPr lang="en-US"/>
           </a:p>
@@ -15305,7 +15316,7 @@
             <a:fld id="{CA0C6ED6-D0B9-4DC5-B1AE-C5D4014C8E49}" type="datetimeFigureOut">
               <a:rPr lang="en-US" smtClean="0"/>
               <a:pPr/>
-              <a:t>6/23/2017</a:t>
+              <a:t>6/29/2017</a:t>
             </a:fld>
             <a:endParaRPr lang="en-US"/>
           </a:p>
@@ -15598,7 +15609,7 @@
             <a:fld id="{CA0C6ED6-D0B9-4DC5-B1AE-C5D4014C8E49}" type="datetimeFigureOut">
               <a:rPr lang="en-US" smtClean="0"/>
               <a:pPr/>
-              <a:t>6/23/2017</a:t>
+              <a:t>6/29/2017</a:t>
             </a:fld>
             <a:endParaRPr lang="en-US"/>
           </a:p>
@@ -15810,7 +15821,7 @@
             <a:fld id="{CA0C6ED6-D0B9-4DC5-B1AE-C5D4014C8E49}" type="datetimeFigureOut">
               <a:rPr lang="en-US" smtClean="0"/>
               <a:pPr/>
-              <a:t>6/23/2017</a:t>
+              <a:t>6/29/2017</a:t>
             </a:fld>
             <a:endParaRPr lang="en-US"/>
           </a:p>
@@ -16019,7 +16030,7 @@
             <a:fld id="{CA0C6ED6-D0B9-4DC5-B1AE-C5D4014C8E49}" type="datetimeFigureOut">
               <a:rPr lang="en-US" smtClean="0"/>
               <a:pPr/>
-              <a:t>6/23/2017</a:t>
+              <a:t>6/29/2017</a:t>
             </a:fld>
             <a:endParaRPr lang="en-US"/>
           </a:p>
@@ -16163,7 +16174,7 @@
             <a:fld id="{CA0C6ED6-D0B9-4DC5-B1AE-C5D4014C8E49}" type="datetimeFigureOut">
               <a:rPr lang="en-US" smtClean="0"/>
               <a:pPr/>
-              <a:t>6/23/2017</a:t>
+              <a:t>6/29/2017</a:t>
             </a:fld>
             <a:endParaRPr lang="en-US"/>
           </a:p>
@@ -16611,14 +16622,14 @@
           <a:effectLst/>
           <a:extLst>
             <a:ext uri="{909E8E84-426E-40dd-AFC4-6F175D3DCCD1}">
-              <a14:hiddenFill xmlns:a14="http://schemas.microsoft.com/office/drawing/2010/main" xmlns="">
+              <a14:hiddenFill xmlns="" xmlns:a14="http://schemas.microsoft.com/office/drawing/2010/main">
                 <a:solidFill>
                   <a:schemeClr val="accent1"/>
                 </a:solidFill>
               </a14:hiddenFill>
             </a:ext>
             <a:ext uri="{91240B29-F687-4f45-9708-019B960494DF}">
-              <a14:hiddenLine xmlns:a14="http://schemas.microsoft.com/office/drawing/2010/main" xmlns="" w="9525">
+              <a14:hiddenLine xmlns="" xmlns:a14="http://schemas.microsoft.com/office/drawing/2010/main" w="9525">
                 <a:solidFill>
                   <a:schemeClr val="tx1"/>
                 </a:solidFill>
@@ -16628,7 +16639,7 @@
               </a14:hiddenLine>
             </a:ext>
             <a:ext uri="{AF507438-7753-43e0-B8FC-AC1667EBCBE1}">
-              <a14:hiddenEffects xmlns:a14="http://schemas.microsoft.com/office/drawing/2010/main" xmlns="">
+              <a14:hiddenEffects xmlns="" xmlns:a14="http://schemas.microsoft.com/office/drawing/2010/main">
                 <a:effectLst>
                   <a:outerShdw blurRad="63500" dist="38099" dir="2700000" algn="ctr" rotWithShape="0">
                     <a:schemeClr val="bg2">
@@ -19092,7 +19103,7 @@
             <a:fld id="{CA0C6ED6-D0B9-4DC5-B1AE-C5D4014C8E49}" type="datetimeFigureOut">
               <a:rPr lang="en-US" smtClean="0"/>
               <a:pPr/>
-              <a:t>6/23/2017</a:t>
+              <a:t>6/29/2017</a:t>
             </a:fld>
             <a:endParaRPr lang="en-US"/>
           </a:p>
@@ -19862,7 +19873,7 @@
             <a:fld id="{CA0C6ED6-D0B9-4DC5-B1AE-C5D4014C8E49}" type="datetimeFigureOut">
               <a:rPr lang="en-US" smtClean="0"/>
               <a:pPr/>
-              <a:t>6/23/2017</a:t>
+              <a:t>6/29/2017</a:t>
             </a:fld>
             <a:endParaRPr lang="en-US"/>
           </a:p>
@@ -20149,7 +20160,7 @@
             <a:fld id="{CA0C6ED6-D0B9-4DC5-B1AE-C5D4014C8E49}" type="datetimeFigureOut">
               <a:rPr lang="en-US" smtClean="0"/>
               <a:pPr/>
-              <a:t>6/23/2017</a:t>
+              <a:t>6/29/2017</a:t>
             </a:fld>
             <a:endParaRPr lang="en-US"/>
           </a:p>
@@ -20381,7 +20392,7 @@
             <a:fld id="{CA0C6ED6-D0B9-4DC5-B1AE-C5D4014C8E49}" type="datetimeFigureOut">
               <a:rPr lang="en-US" smtClean="0"/>
               <a:pPr/>
-              <a:t>6/23/2017</a:t>
+              <a:t>6/29/2017</a:t>
             </a:fld>
             <a:endParaRPr lang="en-US"/>
           </a:p>
@@ -21064,7 +21075,7 @@
             <a:fld id="{770BDA4A-776A-4546-918F-32281E291F21}" type="datetime1">
               <a:rPr lang="sv-SE" smtClean="0"/>
               <a:pPr/>
-              <a:t>2017-06-23</a:t>
+              <a:t>2017-06-29</a:t>
             </a:fld>
             <a:endParaRPr lang="en-US" dirty="0"/>
           </a:p>
@@ -21684,7 +21695,7 @@
             <a:fld id="{CA0C6ED6-D0B9-4DC5-B1AE-C5D4014C8E49}" type="datetimeFigureOut">
               <a:rPr lang="en-US" smtClean="0"/>
               <a:pPr/>
-              <a:t>6/23/2017</a:t>
+              <a:t>6/29/2017</a:t>
             </a:fld>
             <a:endParaRPr lang="en-US"/>
           </a:p>
@@ -23047,7 +23058,7 @@
             <a:fld id="{CA0C6ED6-D0B9-4DC5-B1AE-C5D4014C8E49}" type="datetimeFigureOut">
               <a:rPr lang="en-US" smtClean="0"/>
               <a:pPr/>
-              <a:t>6/23/2017</a:t>
+              <a:t>6/29/2017</a:t>
             </a:fld>
             <a:endParaRPr lang="en-US"/>
           </a:p>
@@ -24446,6 +24457,631 @@
 </p:sld>
 </file>
 
+<file path=ppt/slides/slide10.xml><?xml version="1.0" encoding="utf-8"?>
+<p:sld xmlns:a="http://schemas.openxmlformats.org/drawingml/2006/main" xmlns:r="http://schemas.openxmlformats.org/officeDocument/2006/relationships" xmlns:p="http://schemas.openxmlformats.org/presentationml/2006/main">
+  <p:cSld>
+    <p:spTree>
+      <p:nvGrpSpPr>
+        <p:cNvPr id="1" name=""/>
+        <p:cNvGrpSpPr/>
+        <p:nvPr/>
+      </p:nvGrpSpPr>
+      <p:grpSpPr>
+        <a:xfrm>
+          <a:off x="0" y="0"/>
+          <a:ext cx="0" cy="0"/>
+          <a:chOff x="0" y="0"/>
+          <a:chExt cx="0" cy="0"/>
+        </a:xfrm>
+      </p:grpSpPr>
+      <p:sp>
+        <p:nvSpPr>
+          <p:cNvPr id="2" name="標題 1"/>
+          <p:cNvSpPr>
+            <a:spLocks noGrp="1"/>
+          </p:cNvSpPr>
+          <p:nvPr>
+            <p:ph type="title"/>
+          </p:nvPr>
+        </p:nvSpPr>
+        <p:spPr/>
+        <p:txBody>
+          <a:bodyPr>
+            <a:normAutofit fontScale="90000"/>
+          </a:bodyPr>
+          <a:lstStyle/>
+          <a:p>
+            <a:endParaRPr lang="en-US" dirty="0">
+              <a:latin typeface="微軟正黑體" pitchFamily="34" charset="-120"/>
+              <a:ea typeface="微軟正黑體" pitchFamily="34" charset="-120"/>
+            </a:endParaRPr>
+          </a:p>
+        </p:txBody>
+      </p:sp>
+      <p:sp>
+        <p:nvSpPr>
+          <p:cNvPr id="3" name="內容版面配置區 2"/>
+          <p:cNvSpPr>
+            <a:spLocks noGrp="1"/>
+          </p:cNvSpPr>
+          <p:nvPr>
+            <p:ph sz="quarter" idx="13"/>
+          </p:nvPr>
+        </p:nvSpPr>
+        <p:spPr/>
+        <p:txBody>
+          <a:bodyPr>
+            <a:normAutofit/>
+          </a:bodyPr>
+          <a:lstStyle/>
+          <a:p>
+            <a:endParaRPr lang="en-US" sz="2400" dirty="0"/>
+          </a:p>
+        </p:txBody>
+      </p:sp>
+    </p:spTree>
+    <p:extLst>
+      <p:ext uri="{BB962C8B-B14F-4D97-AF65-F5344CB8AC3E}">
+        <p14:creationId xmlns:p14="http://schemas.microsoft.com/office/powerpoint/2010/main" val="64437441"/>
+      </p:ext>
+    </p:extLst>
+  </p:cSld>
+  <p:clrMapOvr>
+    <a:masterClrMapping/>
+  </p:clrMapOvr>
+</p:sld>
+</file>
+
+<file path=ppt/slides/slide11.xml><?xml version="1.0" encoding="utf-8"?>
+<p:sld xmlns:a="http://schemas.openxmlformats.org/drawingml/2006/main" xmlns:r="http://schemas.openxmlformats.org/officeDocument/2006/relationships" xmlns:p="http://schemas.openxmlformats.org/presentationml/2006/main">
+  <p:cSld>
+    <p:spTree>
+      <p:nvGrpSpPr>
+        <p:cNvPr id="1" name=""/>
+        <p:cNvGrpSpPr/>
+        <p:nvPr/>
+      </p:nvGrpSpPr>
+      <p:grpSpPr>
+        <a:xfrm>
+          <a:off x="0" y="0"/>
+          <a:ext cx="0" cy="0"/>
+          <a:chOff x="0" y="0"/>
+          <a:chExt cx="0" cy="0"/>
+        </a:xfrm>
+      </p:grpSpPr>
+      <p:sp>
+        <p:nvSpPr>
+          <p:cNvPr id="2" name="標題 1"/>
+          <p:cNvSpPr>
+            <a:spLocks noGrp="1"/>
+          </p:cNvSpPr>
+          <p:nvPr>
+            <p:ph type="title"/>
+          </p:nvPr>
+        </p:nvSpPr>
+        <p:spPr/>
+        <p:txBody>
+          <a:bodyPr>
+            <a:normAutofit fontScale="90000"/>
+          </a:bodyPr>
+          <a:lstStyle/>
+          <a:p>
+            <a:endParaRPr lang="en-US" dirty="0">
+              <a:latin typeface="微軟正黑體" pitchFamily="34" charset="-120"/>
+              <a:ea typeface="微軟正黑體" pitchFamily="34" charset="-120"/>
+            </a:endParaRPr>
+          </a:p>
+        </p:txBody>
+      </p:sp>
+      <p:sp>
+        <p:nvSpPr>
+          <p:cNvPr id="3" name="內容版面配置區 2"/>
+          <p:cNvSpPr>
+            <a:spLocks noGrp="1"/>
+          </p:cNvSpPr>
+          <p:nvPr>
+            <p:ph sz="quarter" idx="13"/>
+          </p:nvPr>
+        </p:nvSpPr>
+        <p:spPr/>
+        <p:txBody>
+          <a:bodyPr>
+            <a:normAutofit/>
+          </a:bodyPr>
+          <a:lstStyle/>
+          <a:p>
+            <a:endParaRPr lang="en-US" sz="2400" dirty="0"/>
+          </a:p>
+        </p:txBody>
+      </p:sp>
+    </p:spTree>
+    <p:extLst>
+      <p:ext uri="{BB962C8B-B14F-4D97-AF65-F5344CB8AC3E}">
+        <p14:creationId xmlns:p14="http://schemas.microsoft.com/office/powerpoint/2010/main" val="631074423"/>
+      </p:ext>
+    </p:extLst>
+  </p:cSld>
+  <p:clrMapOvr>
+    <a:masterClrMapping/>
+  </p:clrMapOvr>
+</p:sld>
+</file>
+
+<file path=ppt/slides/slide12.xml><?xml version="1.0" encoding="utf-8"?>
+<p:sld xmlns:a="http://schemas.openxmlformats.org/drawingml/2006/main" xmlns:r="http://schemas.openxmlformats.org/officeDocument/2006/relationships" xmlns:p="http://schemas.openxmlformats.org/presentationml/2006/main">
+  <p:cSld>
+    <p:spTree>
+      <p:nvGrpSpPr>
+        <p:cNvPr id="1" name=""/>
+        <p:cNvGrpSpPr/>
+        <p:nvPr/>
+      </p:nvGrpSpPr>
+      <p:grpSpPr>
+        <a:xfrm>
+          <a:off x="0" y="0"/>
+          <a:ext cx="0" cy="0"/>
+          <a:chOff x="0" y="0"/>
+          <a:chExt cx="0" cy="0"/>
+        </a:xfrm>
+      </p:grpSpPr>
+      <p:sp>
+        <p:nvSpPr>
+          <p:cNvPr id="2" name="標題 1"/>
+          <p:cNvSpPr>
+            <a:spLocks noGrp="1"/>
+          </p:cNvSpPr>
+          <p:nvPr>
+            <p:ph type="title"/>
+          </p:nvPr>
+        </p:nvSpPr>
+        <p:spPr/>
+        <p:txBody>
+          <a:bodyPr>
+            <a:normAutofit fontScale="90000"/>
+          </a:bodyPr>
+          <a:lstStyle/>
+          <a:p>
+            <a:endParaRPr lang="en-US" dirty="0">
+              <a:latin typeface="微軟正黑體" pitchFamily="34" charset="-120"/>
+              <a:ea typeface="微軟正黑體" pitchFamily="34" charset="-120"/>
+            </a:endParaRPr>
+          </a:p>
+        </p:txBody>
+      </p:sp>
+      <p:sp>
+        <p:nvSpPr>
+          <p:cNvPr id="3" name="內容版面配置區 2"/>
+          <p:cNvSpPr>
+            <a:spLocks noGrp="1"/>
+          </p:cNvSpPr>
+          <p:nvPr>
+            <p:ph sz="quarter" idx="13"/>
+          </p:nvPr>
+        </p:nvSpPr>
+        <p:spPr/>
+        <p:txBody>
+          <a:bodyPr>
+            <a:normAutofit/>
+          </a:bodyPr>
+          <a:lstStyle/>
+          <a:p>
+            <a:endParaRPr lang="en-US" sz="2400" dirty="0"/>
+          </a:p>
+        </p:txBody>
+      </p:sp>
+    </p:spTree>
+    <p:extLst>
+      <p:ext uri="{BB962C8B-B14F-4D97-AF65-F5344CB8AC3E}">
+        <p14:creationId xmlns:p14="http://schemas.microsoft.com/office/powerpoint/2010/main" val="1044903674"/>
+      </p:ext>
+    </p:extLst>
+  </p:cSld>
+  <p:clrMapOvr>
+    <a:masterClrMapping/>
+  </p:clrMapOvr>
+</p:sld>
+</file>
+
+<file path=ppt/slides/slide13.xml><?xml version="1.0" encoding="utf-8"?>
+<p:sld xmlns:a="http://schemas.openxmlformats.org/drawingml/2006/main" xmlns:r="http://schemas.openxmlformats.org/officeDocument/2006/relationships" xmlns:p="http://schemas.openxmlformats.org/presentationml/2006/main">
+  <p:cSld>
+    <p:spTree>
+      <p:nvGrpSpPr>
+        <p:cNvPr id="1" name=""/>
+        <p:cNvGrpSpPr/>
+        <p:nvPr/>
+      </p:nvGrpSpPr>
+      <p:grpSpPr>
+        <a:xfrm>
+          <a:off x="0" y="0"/>
+          <a:ext cx="0" cy="0"/>
+          <a:chOff x="0" y="0"/>
+          <a:chExt cx="0" cy="0"/>
+        </a:xfrm>
+      </p:grpSpPr>
+      <p:sp>
+        <p:nvSpPr>
+          <p:cNvPr id="2" name="標題 1"/>
+          <p:cNvSpPr>
+            <a:spLocks noGrp="1"/>
+          </p:cNvSpPr>
+          <p:nvPr>
+            <p:ph type="title"/>
+          </p:nvPr>
+        </p:nvSpPr>
+        <p:spPr/>
+        <p:txBody>
+          <a:bodyPr>
+            <a:normAutofit fontScale="90000"/>
+          </a:bodyPr>
+          <a:lstStyle/>
+          <a:p>
+            <a:endParaRPr lang="en-US" dirty="0">
+              <a:latin typeface="微軟正黑體" pitchFamily="34" charset="-120"/>
+              <a:ea typeface="微軟正黑體" pitchFamily="34" charset="-120"/>
+            </a:endParaRPr>
+          </a:p>
+        </p:txBody>
+      </p:sp>
+      <p:sp>
+        <p:nvSpPr>
+          <p:cNvPr id="3" name="內容版面配置區 2"/>
+          <p:cNvSpPr>
+            <a:spLocks noGrp="1"/>
+          </p:cNvSpPr>
+          <p:nvPr>
+            <p:ph sz="quarter" idx="13"/>
+          </p:nvPr>
+        </p:nvSpPr>
+        <p:spPr/>
+        <p:txBody>
+          <a:bodyPr>
+            <a:normAutofit/>
+          </a:bodyPr>
+          <a:lstStyle/>
+          <a:p>
+            <a:endParaRPr lang="en-US" sz="2400" dirty="0"/>
+          </a:p>
+        </p:txBody>
+      </p:sp>
+    </p:spTree>
+    <p:extLst>
+      <p:ext uri="{BB962C8B-B14F-4D97-AF65-F5344CB8AC3E}">
+        <p14:creationId xmlns:p14="http://schemas.microsoft.com/office/powerpoint/2010/main" val="1483830305"/>
+      </p:ext>
+    </p:extLst>
+  </p:cSld>
+  <p:clrMapOvr>
+    <a:masterClrMapping/>
+  </p:clrMapOvr>
+</p:sld>
+</file>
+
+<file path=ppt/slides/slide14.xml><?xml version="1.0" encoding="utf-8"?>
+<p:sld xmlns:a="http://schemas.openxmlformats.org/drawingml/2006/main" xmlns:r="http://schemas.openxmlformats.org/officeDocument/2006/relationships" xmlns:p="http://schemas.openxmlformats.org/presentationml/2006/main">
+  <p:cSld>
+    <p:spTree>
+      <p:nvGrpSpPr>
+        <p:cNvPr id="1" name=""/>
+        <p:cNvGrpSpPr/>
+        <p:nvPr/>
+      </p:nvGrpSpPr>
+      <p:grpSpPr>
+        <a:xfrm>
+          <a:off x="0" y="0"/>
+          <a:ext cx="0" cy="0"/>
+          <a:chOff x="0" y="0"/>
+          <a:chExt cx="0" cy="0"/>
+        </a:xfrm>
+      </p:grpSpPr>
+      <p:sp>
+        <p:nvSpPr>
+          <p:cNvPr id="2" name="標題 1"/>
+          <p:cNvSpPr>
+            <a:spLocks noGrp="1"/>
+          </p:cNvSpPr>
+          <p:nvPr>
+            <p:ph type="title"/>
+          </p:nvPr>
+        </p:nvSpPr>
+        <p:spPr/>
+        <p:txBody>
+          <a:bodyPr>
+            <a:normAutofit fontScale="90000"/>
+          </a:bodyPr>
+          <a:lstStyle/>
+          <a:p>
+            <a:endParaRPr lang="en-US" dirty="0">
+              <a:latin typeface="微軟正黑體" pitchFamily="34" charset="-120"/>
+              <a:ea typeface="微軟正黑體" pitchFamily="34" charset="-120"/>
+            </a:endParaRPr>
+          </a:p>
+        </p:txBody>
+      </p:sp>
+      <p:sp>
+        <p:nvSpPr>
+          <p:cNvPr id="3" name="內容版面配置區 2"/>
+          <p:cNvSpPr>
+            <a:spLocks noGrp="1"/>
+          </p:cNvSpPr>
+          <p:nvPr>
+            <p:ph sz="quarter" idx="13"/>
+          </p:nvPr>
+        </p:nvSpPr>
+        <p:spPr/>
+        <p:txBody>
+          <a:bodyPr>
+            <a:normAutofit/>
+          </a:bodyPr>
+          <a:lstStyle/>
+          <a:p>
+            <a:endParaRPr lang="en-US" sz="2400" dirty="0"/>
+          </a:p>
+        </p:txBody>
+      </p:sp>
+    </p:spTree>
+    <p:extLst>
+      <p:ext uri="{BB962C8B-B14F-4D97-AF65-F5344CB8AC3E}">
+        <p14:creationId xmlns:p14="http://schemas.microsoft.com/office/powerpoint/2010/main" val="3465961281"/>
+      </p:ext>
+    </p:extLst>
+  </p:cSld>
+  <p:clrMapOvr>
+    <a:masterClrMapping/>
+  </p:clrMapOvr>
+</p:sld>
+</file>
+
+<file path=ppt/slides/slide15.xml><?xml version="1.0" encoding="utf-8"?>
+<p:sld xmlns:a="http://schemas.openxmlformats.org/drawingml/2006/main" xmlns:r="http://schemas.openxmlformats.org/officeDocument/2006/relationships" xmlns:p="http://schemas.openxmlformats.org/presentationml/2006/main">
+  <p:cSld>
+    <p:spTree>
+      <p:nvGrpSpPr>
+        <p:cNvPr id="1" name=""/>
+        <p:cNvGrpSpPr/>
+        <p:nvPr/>
+      </p:nvGrpSpPr>
+      <p:grpSpPr>
+        <a:xfrm>
+          <a:off x="0" y="0"/>
+          <a:ext cx="0" cy="0"/>
+          <a:chOff x="0" y="0"/>
+          <a:chExt cx="0" cy="0"/>
+        </a:xfrm>
+      </p:grpSpPr>
+      <p:sp>
+        <p:nvSpPr>
+          <p:cNvPr id="2" name="標題 1"/>
+          <p:cNvSpPr>
+            <a:spLocks noGrp="1"/>
+          </p:cNvSpPr>
+          <p:nvPr>
+            <p:ph type="title"/>
+          </p:nvPr>
+        </p:nvSpPr>
+        <p:spPr/>
+        <p:txBody>
+          <a:bodyPr>
+            <a:normAutofit fontScale="90000"/>
+          </a:bodyPr>
+          <a:lstStyle/>
+          <a:p>
+            <a:endParaRPr lang="en-US" dirty="0">
+              <a:latin typeface="微軟正黑體" pitchFamily="34" charset="-120"/>
+              <a:ea typeface="微軟正黑體" pitchFamily="34" charset="-120"/>
+            </a:endParaRPr>
+          </a:p>
+        </p:txBody>
+      </p:sp>
+      <p:sp>
+        <p:nvSpPr>
+          <p:cNvPr id="3" name="內容版面配置區 2"/>
+          <p:cNvSpPr>
+            <a:spLocks noGrp="1"/>
+          </p:cNvSpPr>
+          <p:nvPr>
+            <p:ph sz="quarter" idx="13"/>
+          </p:nvPr>
+        </p:nvSpPr>
+        <p:spPr/>
+        <p:txBody>
+          <a:bodyPr>
+            <a:normAutofit/>
+          </a:bodyPr>
+          <a:lstStyle/>
+          <a:p>
+            <a:endParaRPr lang="en-US" sz="2400" dirty="0"/>
+          </a:p>
+        </p:txBody>
+      </p:sp>
+    </p:spTree>
+    <p:extLst>
+      <p:ext uri="{BB962C8B-B14F-4D97-AF65-F5344CB8AC3E}">
+        <p14:creationId xmlns:p14="http://schemas.microsoft.com/office/powerpoint/2010/main" val="2481295656"/>
+      </p:ext>
+    </p:extLst>
+  </p:cSld>
+  <p:clrMapOvr>
+    <a:masterClrMapping/>
+  </p:clrMapOvr>
+</p:sld>
+</file>
+
+<file path=ppt/slides/slide16.xml><?xml version="1.0" encoding="utf-8"?>
+<p:sld xmlns:a="http://schemas.openxmlformats.org/drawingml/2006/main" xmlns:r="http://schemas.openxmlformats.org/officeDocument/2006/relationships" xmlns:p="http://schemas.openxmlformats.org/presentationml/2006/main">
+  <p:cSld>
+    <p:spTree>
+      <p:nvGrpSpPr>
+        <p:cNvPr id="1" name=""/>
+        <p:cNvGrpSpPr/>
+        <p:nvPr/>
+      </p:nvGrpSpPr>
+      <p:grpSpPr>
+        <a:xfrm>
+          <a:off x="0" y="0"/>
+          <a:ext cx="0" cy="0"/>
+          <a:chOff x="0" y="0"/>
+          <a:chExt cx="0" cy="0"/>
+        </a:xfrm>
+      </p:grpSpPr>
+      <p:sp>
+        <p:nvSpPr>
+          <p:cNvPr id="2" name="標題 1"/>
+          <p:cNvSpPr>
+            <a:spLocks noGrp="1"/>
+          </p:cNvSpPr>
+          <p:nvPr>
+            <p:ph type="title"/>
+          </p:nvPr>
+        </p:nvSpPr>
+        <p:spPr/>
+        <p:txBody>
+          <a:bodyPr>
+            <a:normAutofit fontScale="90000"/>
+          </a:bodyPr>
+          <a:lstStyle/>
+          <a:p>
+            <a:endParaRPr lang="en-US" dirty="0">
+              <a:latin typeface="微軟正黑體" pitchFamily="34" charset="-120"/>
+              <a:ea typeface="微軟正黑體" pitchFamily="34" charset="-120"/>
+            </a:endParaRPr>
+          </a:p>
+        </p:txBody>
+      </p:sp>
+      <p:sp>
+        <p:nvSpPr>
+          <p:cNvPr id="3" name="內容版面配置區 2"/>
+          <p:cNvSpPr>
+            <a:spLocks noGrp="1"/>
+          </p:cNvSpPr>
+          <p:nvPr>
+            <p:ph sz="quarter" idx="13"/>
+          </p:nvPr>
+        </p:nvSpPr>
+        <p:spPr/>
+        <p:txBody>
+          <a:bodyPr>
+            <a:normAutofit/>
+          </a:bodyPr>
+          <a:lstStyle/>
+          <a:p>
+            <a:endParaRPr lang="en-US" sz="2400" dirty="0"/>
+          </a:p>
+        </p:txBody>
+      </p:sp>
+    </p:spTree>
+    <p:extLst>
+      <p:ext uri="{BB962C8B-B14F-4D97-AF65-F5344CB8AC3E}">
+        <p14:creationId xmlns:p14="http://schemas.microsoft.com/office/powerpoint/2010/main" val="3118513801"/>
+      </p:ext>
+    </p:extLst>
+  </p:cSld>
+  <p:clrMapOvr>
+    <a:masterClrMapping/>
+  </p:clrMapOvr>
+</p:sld>
+</file>
+
+<file path=ppt/slides/slide17.xml><?xml version="1.0" encoding="utf-8"?>
+<p:sld xmlns:a="http://schemas.openxmlformats.org/drawingml/2006/main" xmlns:r="http://schemas.openxmlformats.org/officeDocument/2006/relationships" xmlns:p="http://schemas.openxmlformats.org/presentationml/2006/main">
+  <p:cSld>
+    <p:spTree>
+      <p:nvGrpSpPr>
+        <p:cNvPr id="1" name=""/>
+        <p:cNvGrpSpPr/>
+        <p:nvPr/>
+      </p:nvGrpSpPr>
+      <p:grpSpPr>
+        <a:xfrm>
+          <a:off x="0" y="0"/>
+          <a:ext cx="0" cy="0"/>
+          <a:chOff x="0" y="0"/>
+          <a:chExt cx="0" cy="0"/>
+        </a:xfrm>
+      </p:grpSpPr>
+      <p:sp>
+        <p:nvSpPr>
+          <p:cNvPr id="2" name="標題 1"/>
+          <p:cNvSpPr>
+            <a:spLocks noGrp="1"/>
+          </p:cNvSpPr>
+          <p:nvPr>
+            <p:ph type="title"/>
+          </p:nvPr>
+        </p:nvSpPr>
+        <p:spPr/>
+        <p:txBody>
+          <a:bodyPr>
+            <a:normAutofit fontScale="90000"/>
+          </a:bodyPr>
+          <a:lstStyle/>
+          <a:p>
+            <a:endParaRPr lang="en-US" dirty="0">
+              <a:latin typeface="微軟正黑體" pitchFamily="34" charset="-120"/>
+              <a:ea typeface="微軟正黑體" pitchFamily="34" charset="-120"/>
+            </a:endParaRPr>
+          </a:p>
+        </p:txBody>
+      </p:sp>
+      <p:sp>
+        <p:nvSpPr>
+          <p:cNvPr id="3" name="內容版面配置區 2"/>
+          <p:cNvSpPr>
+            <a:spLocks noGrp="1"/>
+          </p:cNvSpPr>
+          <p:nvPr>
+            <p:ph sz="quarter" idx="13"/>
+          </p:nvPr>
+        </p:nvSpPr>
+        <p:spPr/>
+        <p:txBody>
+          <a:bodyPr>
+            <a:normAutofit/>
+          </a:bodyPr>
+          <a:lstStyle/>
+          <a:p>
+            <a:endParaRPr lang="en-US" sz="2400" dirty="0"/>
+          </a:p>
+        </p:txBody>
+      </p:sp>
+    </p:spTree>
+    <p:extLst>
+      <p:ext uri="{BB962C8B-B14F-4D97-AF65-F5344CB8AC3E}">
+        <p14:creationId xmlns:p14="http://schemas.microsoft.com/office/powerpoint/2010/main" val="3576509330"/>
+      </p:ext>
+    </p:extLst>
+  </p:cSld>
+  <p:clrMapOvr>
+    <a:masterClrMapping/>
+  </p:clrMapOvr>
+</p:sld>
+</file>
+
+<file path=ppt/slides/slide18.xml><?xml version="1.0" encoding="utf-8"?>
+<p:sld xmlns:a="http://schemas.openxmlformats.org/drawingml/2006/main" xmlns:r="http://schemas.openxmlformats.org/officeDocument/2006/relationships" xmlns:p="http://schemas.openxmlformats.org/presentationml/2006/main">
+  <p:cSld>
+    <p:spTree>
+      <p:nvGrpSpPr>
+        <p:cNvPr id="1" name=""/>
+        <p:cNvGrpSpPr/>
+        <p:nvPr/>
+      </p:nvGrpSpPr>
+      <p:grpSpPr>
+        <a:xfrm>
+          <a:off x="0" y="0"/>
+          <a:ext cx="0" cy="0"/>
+          <a:chOff x="0" y="0"/>
+          <a:chExt cx="0" cy="0"/>
+        </a:xfrm>
+      </p:grpSpPr>
+    </p:spTree>
+  </p:cSld>
+  <p:clrMapOvr>
+    <a:masterClrMapping/>
+  </p:clrMapOvr>
+</p:sld>
+</file>
+
 <file path=ppt/slides/slide2.xml><?xml version="1.0" encoding="utf-8"?>
 <p:sld xmlns:a="http://schemas.openxmlformats.org/drawingml/2006/main" xmlns:r="http://schemas.openxmlformats.org/officeDocument/2006/relationships" xmlns:p="http://schemas.openxmlformats.org/presentationml/2006/main">
   <p:cSld>
@@ -24507,13 +25143,65 @@
         <p:spPr/>
         <p:txBody>
           <a:bodyPr>
-            <a:normAutofit/>
+            <a:normAutofit fontScale="92500" lnSpcReduction="10000"/>
           </a:bodyPr>
           <a:lstStyle/>
           <a:p>
             <a:r>
               <a:rPr lang="en-US" dirty="0" smtClean="0"/>
-              <a:t>$cat readme.txt</a:t>
+              <a:t>man </a:t>
+            </a:r>
+            <a:r>
+              <a:rPr lang="zh-CN" altLang="en-US" dirty="0" smtClean="0"/>
+              <a:t>命令</a:t>
+            </a:r>
+            <a:endParaRPr lang="en-US" altLang="zh-CN" dirty="0" smtClean="0"/>
+          </a:p>
+          <a:p>
+            <a:pPr marL="457200" lvl="1" indent="0">
+              <a:buNone/>
+            </a:pPr>
+            <a:r>
+              <a:rPr lang="zh-CN" altLang="en-US" dirty="0" smtClean="0"/>
+              <a:t>查看某个命令的使用文档。如 </a:t>
+            </a:r>
+            <a:r>
+              <a:rPr lang="en-US" altLang="zh-CN" dirty="0" smtClean="0"/>
+              <a:t>man </a:t>
+            </a:r>
+            <a:r>
+              <a:rPr lang="en-US" altLang="zh-CN" dirty="0" err="1" smtClean="0"/>
+              <a:t>cp</a:t>
+            </a:r>
+            <a:r>
+              <a:rPr lang="zh-CN" altLang="en-US" dirty="0" smtClean="0"/>
+              <a:t>，</a:t>
+            </a:r>
+            <a:r>
+              <a:rPr lang="en-US" altLang="zh-CN" dirty="0" smtClean="0"/>
+              <a:t>man </a:t>
+            </a:r>
+            <a:r>
+              <a:rPr lang="en-US" altLang="zh-CN" dirty="0" err="1" smtClean="0"/>
+              <a:t>mkdir</a:t>
+            </a:r>
+            <a:r>
+              <a:rPr lang="zh-CN" altLang="en-US" dirty="0" smtClean="0"/>
+              <a:t>等</a:t>
+            </a:r>
+            <a:endParaRPr lang="en-US" dirty="0" smtClean="0"/>
+          </a:p>
+          <a:p>
+            <a:endParaRPr lang="en-US" dirty="0" smtClean="0"/>
+          </a:p>
+          <a:p>
+            <a:r>
+              <a:rPr lang="en-US" dirty="0" smtClean="0"/>
+              <a:t>$</a:t>
+            </a:r>
+            <a:r>
+              <a:rPr lang="en-US" dirty="0" smtClean="0"/>
+              <a:t>cat readme.txt</a:t>
             </a:r>
           </a:p>
           <a:p>
@@ -24593,11 +25281,7 @@
             </a:r>
             <a:r>
               <a:rPr lang="zh-CN" altLang="en-US" dirty="0" smtClean="0"/>
-              <a:t>修改文件读写</a:t>
-            </a:r>
-            <a:r>
-              <a:rPr lang="zh-CN" altLang="en-US" dirty="0" smtClean="0"/>
-              <a:t>权限</a:t>
+              <a:t>修改文件读写权限</a:t>
             </a:r>
             <a:endParaRPr lang="en-US" altLang="zh-CN" dirty="0" smtClean="0"/>
           </a:p>
@@ -24651,11 +25335,11 @@
           <a:lstStyle/>
           <a:p>
             <a:r>
-              <a:rPr lang="en-US" altLang="zh-CN" dirty="0" smtClean="0">
+              <a:rPr lang="en-US" dirty="0" err="1" smtClean="0">
                 <a:latin typeface="微軟正黑體" pitchFamily="34" charset="-120"/>
                 <a:ea typeface="微軟正黑體" pitchFamily="34" charset="-120"/>
               </a:rPr>
-              <a:t>File</a:t>
+              <a:t>File_Folder</a:t>
             </a:r>
             <a:endParaRPr lang="en-US" dirty="0">
               <a:latin typeface="微軟正黑體" pitchFamily="34" charset="-120"/>
@@ -24682,160 +25366,138 @@
           <a:lstStyle/>
           <a:p>
             <a:r>
-              <a:rPr lang="en-US" sz="2200" b="1" dirty="0"/>
-              <a:t>$ touch &lt;</a:t>
-            </a:r>
-            <a:r>
-              <a:rPr lang="en-US" altLang="zh-CN" sz="2200" b="1" dirty="0"/>
-              <a:t>filename1&gt; &lt;filename2&gt;…</a:t>
-            </a:r>
-            <a:endParaRPr lang="en-US" altLang="zh-CN" sz="2200" b="1" dirty="0"/>
-          </a:p>
-          <a:p>
-            <a:pPr marL="457200" lvl="1" indent="0">
-              <a:buNone/>
-            </a:pPr>
-            <a:r>
-              <a:rPr lang="zh-CN" altLang="en-US" sz="1700" dirty="0" smtClean="0"/>
-              <a:t>新建空文件，文件名可以不加扩展名</a:t>
-            </a:r>
-            <a:endParaRPr lang="en-US" altLang="zh-CN" sz="1700" dirty="0"/>
-          </a:p>
-          <a:p>
-            <a:r>
-              <a:rPr lang="en-US" altLang="zh-CN" sz="2200" b="1" dirty="0"/>
-              <a:t>$ </a:t>
-            </a:r>
-            <a:r>
-              <a:rPr lang="en-US" altLang="zh-CN" sz="2200" b="1" dirty="0" err="1"/>
+              <a:rPr lang="en-US" altLang="zh-CN" sz="2400" dirty="0" smtClean="0"/>
+              <a:t>t</a:t>
+            </a:r>
+            <a:r>
+              <a:rPr lang="en-US" sz="2400" dirty="0" smtClean="0"/>
+              <a:t>ouch </a:t>
+            </a:r>
+            <a:r>
+              <a:rPr lang="zh-CN" altLang="en-US" sz="2400" dirty="0" smtClean="0"/>
+              <a:t>新建空文件</a:t>
+            </a:r>
+            <a:endParaRPr lang="en-US" altLang="zh-CN" sz="2400" dirty="0" smtClean="0"/>
+          </a:p>
+          <a:p>
+            <a:r>
+              <a:rPr lang="en-US" sz="2400" dirty="0" err="1" smtClean="0"/>
+              <a:t>mkdir</a:t>
+            </a:r>
+            <a:r>
+              <a:rPr lang="en-US" sz="2400" dirty="0" smtClean="0"/>
+              <a:t> </a:t>
+            </a:r>
+            <a:r>
+              <a:rPr lang="zh-CN" altLang="en-US" sz="2400" dirty="0" smtClean="0"/>
+              <a:t>新建目录</a:t>
+            </a:r>
+            <a:endParaRPr lang="en-US" altLang="zh-CN" sz="2400" dirty="0" smtClean="0"/>
+          </a:p>
+          <a:p>
+            <a:r>
+              <a:rPr lang="en-US" altLang="zh-CN" sz="2400" dirty="0" err="1" smtClean="0"/>
+              <a:t>rmdir</a:t>
+            </a:r>
+            <a:r>
+              <a:rPr lang="en-US" altLang="zh-CN" sz="2400" dirty="0" smtClean="0"/>
+              <a:t> </a:t>
+            </a:r>
+            <a:r>
+              <a:rPr lang="zh-CN" altLang="en-US" sz="2400" dirty="0" smtClean="0"/>
+              <a:t>删除一个空目录</a:t>
+            </a:r>
+            <a:endParaRPr lang="en-US" altLang="zh-CN" sz="2400" dirty="0" smtClean="0"/>
+          </a:p>
+          <a:p>
+            <a:r>
+              <a:rPr lang="en-US" altLang="zh-CN" sz="2400" dirty="0" err="1" smtClean="0"/>
               <a:t>rm</a:t>
             </a:r>
             <a:r>
-              <a:rPr lang="en-US" altLang="zh-CN" sz="2200" b="1" dirty="0"/>
-              <a:t> &lt;file_full_name1&gt; &lt;file_full_name2&gt;…</a:t>
-            </a:r>
-          </a:p>
-          <a:p>
-            <a:pPr marL="457200" lvl="1" indent="0">
-              <a:buNone/>
-            </a:pPr>
-            <a:r>
-              <a:rPr lang="zh-CN" altLang="en-US" sz="1700" dirty="0"/>
+              <a:rPr lang="en-US" altLang="zh-CN" sz="2400" dirty="0" smtClean="0"/>
+              <a:t> </a:t>
+            </a:r>
+            <a:r>
+              <a:rPr lang="zh-CN" altLang="en-US" sz="2400" dirty="0" smtClean="0"/>
               <a:t>删除文件</a:t>
             </a:r>
-            <a:endParaRPr lang="en-US" altLang="zh-CN" sz="1700" dirty="0"/>
-          </a:p>
-          <a:p>
-            <a:r>
-              <a:rPr lang="en-US" altLang="zh-CN" sz="2200" b="1" dirty="0"/>
-              <a:t>$ mv &lt;src_file_full_name1&gt; &lt;</a:t>
-            </a:r>
-            <a:r>
-              <a:rPr lang="en-US" altLang="zh-CN" sz="2200" b="1" dirty="0"/>
-              <a:t>src_file_full_name2&gt;… </a:t>
-            </a:r>
-            <a:r>
-              <a:rPr lang="en-US" altLang="zh-CN" sz="2200" b="1" dirty="0"/>
-              <a:t>&lt;</a:t>
-            </a:r>
-            <a:r>
-              <a:rPr lang="en-US" altLang="zh-CN" sz="2200" b="1" dirty="0" err="1"/>
-              <a:t>dest_file_path</a:t>
-            </a:r>
-            <a:r>
-              <a:rPr lang="en-US" altLang="zh-CN" sz="2200" b="1" dirty="0"/>
-              <a:t>&gt;</a:t>
-            </a:r>
-          </a:p>
-          <a:p>
-            <a:pPr marL="457200" lvl="1" indent="0">
-              <a:buNone/>
-            </a:pPr>
-            <a:r>
-              <a:rPr lang="zh-CN" altLang="en-US" sz="1700" dirty="0"/>
-              <a:t>移动文件</a:t>
-            </a:r>
-            <a:endParaRPr lang="en-US" altLang="zh-CN" sz="1700" dirty="0"/>
-          </a:p>
-          <a:p>
-            <a:r>
-              <a:rPr lang="en-US" altLang="zh-CN" sz="2200" b="1" dirty="0"/>
-              <a:t>$ mv &lt;src_file_full_name1&gt; &lt;dest_file_full_name2&gt;</a:t>
-            </a:r>
-          </a:p>
-          <a:p>
-            <a:pPr marL="457200" lvl="1" indent="0">
-              <a:buNone/>
-            </a:pPr>
-            <a:r>
-              <a:rPr lang="zh-CN" altLang="en-US" sz="1600" dirty="0"/>
-              <a:t>重命名文件</a:t>
-            </a:r>
-            <a:endParaRPr lang="en-US" altLang="zh-CN" sz="1600" dirty="0"/>
-          </a:p>
-          <a:p>
-            <a:pPr marL="457200" lvl="1" indent="0">
-              <a:buNone/>
-            </a:pPr>
-            <a:r>
-              <a:rPr lang="en-US" altLang="zh-CN" sz="1600" dirty="0"/>
-              <a:t>m</a:t>
-            </a:r>
-            <a:r>
-              <a:rPr lang="en-US" altLang="zh-CN" sz="1600" dirty="0"/>
-              <a:t>v</a:t>
-            </a:r>
-            <a:r>
-              <a:rPr lang="zh-CN" altLang="en-US" sz="1600" dirty="0"/>
-              <a:t>命令中，如果路径不同就移动文件，如果文件名不同，就重命名文件，两者均不同，就既移动文件同时也重命名文件</a:t>
-            </a:r>
-            <a:endParaRPr lang="en-US" altLang="zh-CN" sz="1600" dirty="0"/>
-          </a:p>
-          <a:p>
-            <a:r>
-              <a:rPr lang="en-US" altLang="zh-CN" sz="2200" b="1" dirty="0" smtClean="0"/>
-              <a:t>$ </a:t>
-            </a:r>
-            <a:r>
-              <a:rPr lang="en-US" altLang="zh-CN" sz="2200" b="1" dirty="0" err="1" smtClean="0"/>
+            <a:endParaRPr lang="en-US" altLang="zh-CN" sz="2400" dirty="0" smtClean="0"/>
+          </a:p>
+          <a:p>
+            <a:r>
+              <a:rPr lang="en-US" altLang="zh-CN" sz="2400" dirty="0" err="1" smtClean="0"/>
+              <a:t>rm</a:t>
+            </a:r>
+            <a:r>
+              <a:rPr lang="en-US" altLang="zh-CN" sz="2400" dirty="0"/>
+              <a:t> </a:t>
+            </a:r>
+            <a:r>
+              <a:rPr lang="en-US" altLang="zh-CN" sz="2400" dirty="0" smtClean="0"/>
+              <a:t>-</a:t>
+            </a:r>
+            <a:r>
+              <a:rPr lang="en-US" altLang="zh-CN" sz="2400" dirty="0" err="1" smtClean="0"/>
+              <a:t>rf</a:t>
+            </a:r>
+            <a:r>
+              <a:rPr lang="en-US" altLang="zh-CN" sz="2400" dirty="0" smtClean="0"/>
+              <a:t> </a:t>
+            </a:r>
+            <a:r>
+              <a:rPr lang="zh-CN" altLang="en-US" sz="2400" dirty="0" smtClean="0"/>
+              <a:t>删除整个文件夹</a:t>
+            </a:r>
+            <a:endParaRPr lang="en-US" altLang="zh-CN" sz="2400" dirty="0" smtClean="0"/>
+          </a:p>
+          <a:p>
+            <a:r>
+              <a:rPr lang="en-US" altLang="zh-CN" sz="2400" dirty="0" err="1" smtClean="0"/>
               <a:t>cp</a:t>
             </a:r>
             <a:r>
-              <a:rPr lang="en-US" altLang="zh-CN" sz="2200" b="1" dirty="0" smtClean="0"/>
-              <a:t> &lt;src_file_full_name1&gt; &lt;src_file_full_name2&gt;… &lt;</a:t>
-            </a:r>
-            <a:r>
-              <a:rPr lang="en-US" altLang="zh-CN" sz="2200" b="1" dirty="0" err="1" smtClean="0"/>
-              <a:t>dest_file_path</a:t>
-            </a:r>
-            <a:r>
-              <a:rPr lang="en-US" altLang="zh-CN" sz="2200" b="1" dirty="0" smtClean="0"/>
-              <a:t>&gt;</a:t>
-            </a:r>
-          </a:p>
-          <a:p>
-            <a:pPr marL="457200" lvl="1" indent="0">
-              <a:buNone/>
-            </a:pPr>
-            <a:r>
-              <a:rPr lang="zh-CN" altLang="en-US" sz="1600" dirty="0"/>
-              <a:t>复制</a:t>
-            </a:r>
-            <a:r>
-              <a:rPr lang="zh-CN" altLang="en-US" sz="1600" dirty="0"/>
-              <a:t>文件</a:t>
-            </a:r>
-            <a:endParaRPr lang="en-US" altLang="zh-CN" sz="1600" dirty="0"/>
-          </a:p>
-          <a:p>
+              <a:rPr lang="en-US" altLang="zh-CN" sz="2400" dirty="0" smtClean="0"/>
+              <a:t> </a:t>
+            </a:r>
+            <a:r>
+              <a:rPr lang="zh-CN" altLang="en-US" sz="2400" dirty="0" smtClean="0"/>
+              <a:t>复制文件或目录，复制的同时可对复制得到的文件或目录重命名</a:t>
+            </a:r>
             <a:endParaRPr lang="en-US" altLang="zh-CN" sz="2400" dirty="0" smtClean="0"/>
+          </a:p>
+          <a:p>
+            <a:r>
+              <a:rPr lang="en-US" sz="2400" dirty="0" err="1" smtClean="0"/>
+              <a:t>rm</a:t>
+            </a:r>
+            <a:r>
+              <a:rPr lang="en-US" sz="2400" dirty="0" smtClean="0"/>
+              <a:t> </a:t>
+            </a:r>
+            <a:r>
+              <a:rPr lang="zh-CN" altLang="en-US" sz="2400" dirty="0" smtClean="0"/>
+              <a:t>移除文件或目录</a:t>
+            </a:r>
+            <a:endParaRPr lang="en-US" altLang="zh-CN" sz="2400" dirty="0" smtClean="0"/>
+          </a:p>
+          <a:p>
+            <a:r>
+              <a:rPr lang="en-US" altLang="zh-CN" sz="2400" dirty="0" smtClean="0"/>
+              <a:t>mv </a:t>
+            </a:r>
+            <a:r>
+              <a:rPr lang="zh-CN" altLang="en-US" sz="2400" dirty="0" smtClean="0"/>
+              <a:t>移动或重命名文件或目录</a:t>
+            </a:r>
+            <a:endParaRPr lang="en-US" sz="2400" dirty="0"/>
           </a:p>
         </p:txBody>
       </p:sp>
     </p:spTree>
     <p:extLst>
       <p:ext uri="{BB962C8B-B14F-4D97-AF65-F5344CB8AC3E}">
-        <p14:creationId xmlns:p14="http://schemas.microsoft.com/office/powerpoint/2010/main" val="2012184485"/>
+        <p14:creationId xmlns:p14="http://schemas.microsoft.com/office/powerpoint/2010/main" val="344385195"/>
       </p:ext>
     </p:extLst>
   </p:cSld>
@@ -24884,7 +25546,7 @@
                 <a:latin typeface="微軟正黑體" pitchFamily="34" charset="-120"/>
                 <a:ea typeface="微軟正黑體" pitchFamily="34" charset="-120"/>
               </a:rPr>
-              <a:t>Folder</a:t>
+              <a:t>File</a:t>
             </a:r>
             <a:endParaRPr lang="en-US" dirty="0">
               <a:latin typeface="微軟正黑體" pitchFamily="34" charset="-120"/>
@@ -24911,326 +25573,147 @@
           <a:lstStyle/>
           <a:p>
             <a:r>
-              <a:rPr lang="en-US" sz="2200" dirty="0" smtClean="0"/>
+              <a:rPr lang="en-US" sz="2200" b="1" dirty="0"/>
+              <a:t>$ touch &lt;</a:t>
+            </a:r>
+            <a:r>
+              <a:rPr lang="en-US" altLang="zh-CN" sz="2200" b="1" dirty="0"/>
+              <a:t>filename1&gt; &lt;filename2&gt;…</a:t>
+            </a:r>
+          </a:p>
+          <a:p>
+            <a:pPr marL="457200" lvl="1" indent="0">
+              <a:buNone/>
+            </a:pPr>
+            <a:r>
+              <a:rPr lang="zh-CN" altLang="en-US" sz="1700" dirty="0" smtClean="0"/>
+              <a:t>新建空文件，文件名可以不加扩展名</a:t>
+            </a:r>
+            <a:endParaRPr lang="en-US" altLang="zh-CN" sz="1700" dirty="0"/>
+          </a:p>
+          <a:p>
+            <a:r>
+              <a:rPr lang="en-US" altLang="zh-CN" sz="2200" b="1" dirty="0"/>
               <a:t>$ </a:t>
             </a:r>
             <a:r>
-              <a:rPr lang="en-US" sz="2200" dirty="0" err="1" smtClean="0"/>
-              <a:t>mkdir</a:t>
-            </a:r>
-            <a:r>
-              <a:rPr lang="en-US" sz="2200" dirty="0" smtClean="0"/>
-              <a:t> &lt;new-folder1&gt; &lt;new-folder2&gt;…</a:t>
-            </a:r>
-          </a:p>
-          <a:p>
-            <a:pPr marL="0" lvl="1" indent="0">
-              <a:lnSpc>
-                <a:spcPct val="90000"/>
-              </a:lnSpc>
-              <a:buClr>
-                <a:schemeClr val="accent1"/>
-              </a:buClr>
+              <a:rPr lang="en-US" altLang="zh-CN" sz="2200" b="1" dirty="0" err="1"/>
+              <a:t>rm</a:t>
+            </a:r>
+            <a:r>
+              <a:rPr lang="en-US" altLang="zh-CN" sz="2200" b="1" dirty="0"/>
+              <a:t> &lt;file_full_name1&gt; &lt;file_full_name2&gt;…</a:t>
+            </a:r>
+          </a:p>
+          <a:p>
+            <a:pPr marL="457200" lvl="1" indent="0">
               <a:buNone/>
             </a:pPr>
             <a:r>
-              <a:rPr lang="en-US" altLang="zh-CN" sz="1600" dirty="0" smtClean="0"/>
-              <a:t>	</a:t>
+              <a:rPr lang="zh-CN" altLang="en-US" sz="1700" dirty="0"/>
+              <a:t>删除文件</a:t>
+            </a:r>
+            <a:endParaRPr lang="en-US" altLang="zh-CN" sz="1700" dirty="0"/>
+          </a:p>
+          <a:p>
+            <a:r>
+              <a:rPr lang="en-US" altLang="zh-CN" sz="2200" b="1" dirty="0"/>
+              <a:t>$ mv &lt;src_file_full_name1&gt; &lt;src_file_full_name2&gt;… &lt;</a:t>
+            </a:r>
+            <a:r>
+              <a:rPr lang="en-US" altLang="zh-CN" sz="2200" b="1" dirty="0" err="1"/>
+              <a:t>dest_file_path</a:t>
+            </a:r>
+            <a:r>
+              <a:rPr lang="en-US" altLang="zh-CN" sz="2200" b="1" dirty="0"/>
+              <a:t>&gt;</a:t>
+            </a:r>
+          </a:p>
+          <a:p>
+            <a:pPr marL="457200" lvl="1" indent="0">
+              <a:buNone/>
+            </a:pPr>
+            <a:r>
+              <a:rPr lang="zh-CN" altLang="en-US" sz="1700" dirty="0"/>
+              <a:t>移动文件</a:t>
+            </a:r>
+            <a:endParaRPr lang="en-US" altLang="zh-CN" sz="1700" dirty="0"/>
+          </a:p>
+          <a:p>
+            <a:r>
+              <a:rPr lang="en-US" altLang="zh-CN" sz="2200" b="1" dirty="0"/>
+              <a:t>$ mv &lt;src_file_full_name1&gt; &lt;dest_file_full_name2&gt;</a:t>
+            </a:r>
+          </a:p>
+          <a:p>
+            <a:pPr marL="457200" lvl="1" indent="0">
+              <a:buNone/>
+            </a:pPr>
+            <a:r>
+              <a:rPr lang="zh-CN" altLang="en-US" sz="1600" dirty="0"/>
+              <a:t>重命名文件</a:t>
+            </a:r>
+            <a:endParaRPr lang="en-US" altLang="zh-CN" sz="1600" dirty="0"/>
+          </a:p>
+          <a:p>
+            <a:pPr marL="457200" lvl="1" indent="0">
+              <a:buNone/>
+            </a:pPr>
+            <a:r>
+              <a:rPr lang="en-US" altLang="zh-CN" sz="1600" dirty="0"/>
+              <a:t>mv</a:t>
+            </a:r>
+            <a:r>
+              <a:rPr lang="zh-CN" altLang="en-US" sz="1600" dirty="0"/>
+              <a:t>命令中，如果路径不同就移动文件，如果文件名不同，就重命名文件，两者均不同，就既移动文件同时也重命名文件</a:t>
+            </a:r>
+            <a:endParaRPr lang="en-US" altLang="zh-CN" sz="1600" dirty="0"/>
+          </a:p>
+          <a:p>
+            <a:r>
+              <a:rPr lang="en-US" altLang="zh-CN" sz="2200" b="1" dirty="0" smtClean="0"/>
+              <a:t>$ </a:t>
+            </a:r>
+            <a:r>
+              <a:rPr lang="en-US" altLang="zh-CN" sz="2200" b="1" dirty="0" err="1" smtClean="0"/>
+              <a:t>cp</a:t>
+            </a:r>
+            <a:r>
+              <a:rPr lang="en-US" altLang="zh-CN" sz="2200" b="1" dirty="0" smtClean="0"/>
+              <a:t> &lt;src_file_full_name1&gt; &lt;src_file_full_name2&gt;… &lt;</a:t>
+            </a:r>
+            <a:r>
+              <a:rPr lang="en-US" altLang="zh-CN" sz="2200" b="1" dirty="0" err="1" smtClean="0"/>
+              <a:t>dest_file_path</a:t>
+            </a:r>
+            <a:r>
+              <a:rPr lang="en-US" altLang="zh-CN" sz="2200" b="1" dirty="0" smtClean="0"/>
+              <a:t>&gt;</a:t>
+            </a:r>
+          </a:p>
+          <a:p>
+            <a:pPr marL="457200" lvl="1" indent="0">
+              <a:buNone/>
+            </a:pPr>
+            <a:r>
+              <a:rPr lang="zh-CN" altLang="en-US" sz="1600" dirty="0"/>
+              <a:t>复制</a:t>
             </a:r>
             <a:r>
               <a:rPr lang="zh-CN" altLang="en-US" sz="1600" dirty="0" smtClean="0"/>
-              <a:t>新建</a:t>
-            </a:r>
-            <a:r>
-              <a:rPr lang="zh-CN" altLang="en-US" sz="1600" dirty="0"/>
-              <a:t>文件夹</a:t>
-            </a:r>
-            <a:endParaRPr lang="en-US" sz="1600" dirty="0"/>
-          </a:p>
-          <a:p>
-            <a:r>
-              <a:rPr lang="en-US" sz="2200" dirty="0"/>
-              <a:t>$ </a:t>
-            </a:r>
-            <a:r>
-              <a:rPr lang="en-US" sz="2200" dirty="0" err="1"/>
-              <a:t>rmdir</a:t>
-            </a:r>
-            <a:r>
-              <a:rPr lang="en-US" sz="2200" dirty="0"/>
-              <a:t> &lt;empty_folder_path1&gt; &lt;empty_folder_path2&gt;…</a:t>
-            </a:r>
-          </a:p>
-          <a:p>
-            <a:pPr marL="0" lvl="1" indent="0">
-              <a:buClr>
-                <a:schemeClr val="accent1"/>
-              </a:buClr>
-              <a:buNone/>
-            </a:pPr>
-            <a:r>
-              <a:rPr lang="en-US" altLang="zh-CN" sz="1600" dirty="0" smtClean="0"/>
-              <a:t>	</a:t>
-            </a:r>
-            <a:r>
-              <a:rPr lang="zh-CN" altLang="en-US" sz="1600" dirty="0" smtClean="0"/>
-              <a:t>删除</a:t>
-            </a:r>
-            <a:r>
-              <a:rPr lang="zh-CN" altLang="en-US" sz="1600" dirty="0"/>
-              <a:t>空文件夹</a:t>
-            </a:r>
-            <a:endParaRPr lang="en-US" sz="1600" dirty="0"/>
-          </a:p>
-          <a:p>
-            <a:r>
-              <a:rPr lang="en-US" sz="2200" dirty="0"/>
-              <a:t>$ </a:t>
-            </a:r>
-            <a:r>
-              <a:rPr lang="en-US" sz="2200" dirty="0" err="1"/>
-              <a:t>rm</a:t>
-            </a:r>
-            <a:r>
-              <a:rPr lang="en-US" sz="2200" dirty="0"/>
-              <a:t> -</a:t>
-            </a:r>
-            <a:r>
-              <a:rPr lang="en-US" sz="2200" dirty="0" err="1"/>
-              <a:t>rf</a:t>
-            </a:r>
-            <a:r>
-              <a:rPr lang="en-US" sz="2200" dirty="0"/>
-              <a:t> &lt;folder_path1&gt; &lt;folder_path2&gt;…</a:t>
-            </a:r>
-          </a:p>
-          <a:p>
-            <a:pPr marL="0" lvl="1" indent="0">
-              <a:buClr>
-                <a:schemeClr val="accent1"/>
-              </a:buClr>
-              <a:buNone/>
-            </a:pPr>
-            <a:r>
-              <a:rPr lang="en-US" altLang="zh-CN" sz="1600" dirty="0" smtClean="0"/>
-              <a:t>	</a:t>
-            </a:r>
-            <a:r>
-              <a:rPr lang="zh-CN" altLang="en-US" sz="1600" dirty="0" smtClean="0"/>
-              <a:t>删除</a:t>
-            </a:r>
-            <a:r>
-              <a:rPr lang="zh-CN" altLang="en-US" sz="1600" dirty="0"/>
-              <a:t>整个文件夹</a:t>
-            </a:r>
-            <a:endParaRPr lang="en-US" sz="1600" dirty="0"/>
-          </a:p>
-          <a:p>
-            <a:r>
-              <a:rPr lang="en-US" sz="2200" dirty="0"/>
-              <a:t>$ mv &lt;src_folder_path1&gt; &lt;src_folder_path2&gt;… &lt;</a:t>
-            </a:r>
-            <a:r>
-              <a:rPr lang="en-US" sz="2200" dirty="0" err="1"/>
-              <a:t>dest_path</a:t>
-            </a:r>
-            <a:r>
-              <a:rPr lang="en-US" sz="2200" dirty="0"/>
-              <a:t>&gt;</a:t>
-            </a:r>
-          </a:p>
-          <a:p>
-            <a:pPr marL="0" lvl="1" indent="0">
-              <a:lnSpc>
-                <a:spcPct val="90000"/>
-              </a:lnSpc>
-              <a:buClr>
-                <a:schemeClr val="accent1"/>
-              </a:buClr>
-              <a:buNone/>
-            </a:pPr>
-            <a:r>
-              <a:rPr lang="en-US" altLang="zh-CN" sz="1700" dirty="0" smtClean="0"/>
-              <a:t>	</a:t>
-            </a:r>
-            <a:r>
-              <a:rPr lang="zh-CN" altLang="en-US" sz="1700" dirty="0" smtClean="0"/>
-              <a:t>移动</a:t>
-            </a:r>
-            <a:r>
-              <a:rPr lang="zh-CN" altLang="en-US" sz="1700" dirty="0"/>
-              <a:t>文件夹，需要待移动的文件夹名称后面加</a:t>
-            </a:r>
-            <a:r>
-              <a:rPr lang="en-US" altLang="zh-CN" sz="1700" dirty="0"/>
-              <a:t>/</a:t>
-            </a:r>
-            <a:r>
-              <a:rPr lang="zh-CN" altLang="en-US" sz="1700" dirty="0"/>
-              <a:t>，表示移动的是文件夹</a:t>
-            </a:r>
-            <a:endParaRPr lang="en-US" sz="1700" dirty="0"/>
-          </a:p>
-          <a:p>
-            <a:r>
-              <a:rPr lang="en-US" sz="2200" dirty="0"/>
-              <a:t>$ mv &lt;</a:t>
-            </a:r>
-            <a:r>
-              <a:rPr lang="en-US" sz="2200" dirty="0" err="1"/>
-              <a:t>src_folder_path</a:t>
-            </a:r>
-            <a:r>
-              <a:rPr lang="en-US" sz="2200" dirty="0"/>
-              <a:t>&gt; &lt;</a:t>
-            </a:r>
-            <a:r>
-              <a:rPr lang="en-US" sz="2200" dirty="0" err="1"/>
-              <a:t>dest_folder_path</a:t>
-            </a:r>
-            <a:r>
-              <a:rPr lang="en-US" sz="2200" dirty="0"/>
-              <a:t>&gt;</a:t>
-            </a:r>
-          </a:p>
-          <a:p>
-            <a:pPr marL="0" lvl="1" indent="0">
-              <a:lnSpc>
-                <a:spcPct val="90000"/>
-              </a:lnSpc>
-              <a:buClr>
-                <a:schemeClr val="accent1"/>
-              </a:buClr>
-              <a:buNone/>
-            </a:pPr>
-            <a:r>
-              <a:rPr lang="en-US" altLang="zh-CN" sz="1700" dirty="0" smtClean="0"/>
-              <a:t>	</a:t>
-            </a:r>
-            <a:r>
-              <a:rPr lang="zh-CN" altLang="en-US" sz="1700" dirty="0" smtClean="0"/>
-              <a:t>重命名</a:t>
-            </a:r>
-            <a:r>
-              <a:rPr lang="zh-CN" altLang="en-US" sz="1700" dirty="0"/>
-              <a:t>文件夹</a:t>
-            </a:r>
-            <a:endParaRPr lang="en-US" sz="1700" dirty="0"/>
-          </a:p>
-          <a:p>
-            <a:pPr marL="0" indent="0">
-              <a:buNone/>
-            </a:pPr>
-            <a:r>
-              <a:rPr lang="en-US" altLang="zh-CN" sz="1700" dirty="0" smtClean="0"/>
-              <a:t>	m</a:t>
-            </a:r>
-            <a:r>
-              <a:rPr lang="en-US" sz="1700" dirty="0" smtClean="0"/>
-              <a:t>v</a:t>
-            </a:r>
-            <a:r>
-              <a:rPr lang="zh-CN" altLang="en-US" sz="1700" dirty="0" smtClean="0"/>
-              <a:t>命令中，如果文件夹路径不同就移动文件夹，如果文件夹名称不同就重命名</a:t>
-            </a:r>
-            <a:r>
-              <a:rPr lang="en-US" altLang="zh-CN" sz="1700" dirty="0" smtClean="0"/>
-              <a:t>	</a:t>
-            </a:r>
-            <a:r>
-              <a:rPr lang="zh-CN" altLang="en-US" sz="1700" dirty="0" smtClean="0"/>
-              <a:t>文件夹，两者均不同，就既移动文件夹同时也重命名文件夹</a:t>
-            </a:r>
-            <a:endParaRPr lang="en-US" sz="1700" dirty="0" smtClean="0"/>
-          </a:p>
-          <a:p>
-            <a:r>
-              <a:rPr lang="en-US" sz="2200" dirty="0"/>
-              <a:t>$ </a:t>
-            </a:r>
-            <a:r>
-              <a:rPr lang="en-US" sz="2200" dirty="0" err="1"/>
-              <a:t>cp</a:t>
-            </a:r>
-            <a:r>
-              <a:rPr lang="en-US" sz="2200" dirty="0"/>
-              <a:t> -r &lt;src_folder_path1&gt; &lt;src_folder_path2&gt;… &lt;</a:t>
-            </a:r>
-            <a:r>
-              <a:rPr lang="en-US" sz="2200" dirty="0" err="1"/>
-              <a:t>dest_path</a:t>
-            </a:r>
-            <a:r>
-              <a:rPr lang="en-US" sz="2200" dirty="0"/>
-              <a:t>&gt;</a:t>
-            </a:r>
-          </a:p>
-          <a:p>
-            <a:pPr marL="0" lvl="1" indent="0">
-              <a:buClr>
-                <a:schemeClr val="accent1"/>
-              </a:buClr>
-              <a:buNone/>
-            </a:pPr>
-            <a:r>
-              <a:rPr lang="en-US" altLang="zh-CN" sz="1700" dirty="0" smtClean="0"/>
-              <a:t>	</a:t>
-            </a:r>
-            <a:r>
-              <a:rPr lang="zh-CN" altLang="en-US" sz="1700" dirty="0" smtClean="0"/>
-              <a:t>复制</a:t>
-            </a:r>
-            <a:r>
-              <a:rPr lang="zh-CN" altLang="en-US" sz="1700" dirty="0"/>
-              <a:t>文件夹，需在文件夹名称后面加上</a:t>
-            </a:r>
-            <a:r>
-              <a:rPr lang="en-US" altLang="zh-CN" sz="1700" dirty="0"/>
-              <a:t>/</a:t>
-            </a:r>
-            <a:r>
-              <a:rPr lang="zh-CN" altLang="en-US" sz="1700" dirty="0"/>
-              <a:t>，表示复制的是一个文件夹，若待</a:t>
-            </a:r>
-            <a:r>
-              <a:rPr lang="zh-CN" altLang="en-US" sz="1700" dirty="0" smtClean="0"/>
-              <a:t>复制</a:t>
-            </a:r>
-            <a:r>
-              <a:rPr lang="en-US" altLang="zh-CN" sz="1700" dirty="0" smtClean="0"/>
-              <a:t>	</a:t>
-            </a:r>
-            <a:r>
-              <a:rPr lang="zh-CN" altLang="en-US" sz="1700" dirty="0" smtClean="0"/>
-              <a:t>文件夹</a:t>
-            </a:r>
-            <a:r>
-              <a:rPr lang="zh-CN" altLang="en-US" sz="1700" dirty="0"/>
-              <a:t>中还有子文件夹，需使用</a:t>
-            </a:r>
-            <a:r>
-              <a:rPr lang="en-US" altLang="zh-CN" sz="1700" dirty="0"/>
-              <a:t> </a:t>
-            </a:r>
-            <a:r>
-              <a:rPr lang="en-US" altLang="zh-CN" sz="1700" dirty="0"/>
-              <a:t>-r </a:t>
-            </a:r>
-            <a:r>
-              <a:rPr lang="zh-CN" altLang="en-US" sz="1700" dirty="0"/>
-              <a:t>参数。</a:t>
-            </a:r>
-            <a:endParaRPr lang="en-US" sz="1700" dirty="0"/>
-          </a:p>
-          <a:p>
-            <a:endParaRPr lang="en-US" sz="2400" dirty="0"/>
+              <a:t>文件，复制同时可以重命名</a:t>
+            </a:r>
+            <a:endParaRPr lang="en-US" altLang="zh-CN" sz="1600" dirty="0"/>
+          </a:p>
+          <a:p>
+            <a:endParaRPr lang="en-US" altLang="zh-CN" sz="2400" dirty="0" smtClean="0"/>
           </a:p>
         </p:txBody>
       </p:sp>
     </p:spTree>
     <p:extLst>
       <p:ext uri="{BB962C8B-B14F-4D97-AF65-F5344CB8AC3E}">
-        <p14:creationId xmlns:p14="http://schemas.microsoft.com/office/powerpoint/2010/main" val="774482894"/>
+        <p14:creationId xmlns:p14="http://schemas.microsoft.com/office/powerpoint/2010/main" val="2012184485"/>
       </p:ext>
     </p:extLst>
   </p:cSld>
@@ -25274,6 +25757,13 @@
           </a:bodyPr>
           <a:lstStyle/>
           <a:p>
+            <a:r>
+              <a:rPr lang="en-US" altLang="zh-CN" dirty="0" smtClean="0">
+                <a:latin typeface="微軟正黑體" pitchFamily="34" charset="-120"/>
+                <a:ea typeface="微軟正黑體" pitchFamily="34" charset="-120"/>
+              </a:rPr>
+              <a:t>Folder</a:t>
+            </a:r>
             <a:endParaRPr lang="en-US" dirty="0">
               <a:latin typeface="微軟正黑體" pitchFamily="34" charset="-120"/>
               <a:ea typeface="微軟正黑體" pitchFamily="34" charset="-120"/>
@@ -25298,6 +25788,319 @@
           </a:bodyPr>
           <a:lstStyle/>
           <a:p>
+            <a:r>
+              <a:rPr lang="en-US" sz="2200" dirty="0" smtClean="0"/>
+              <a:t>$ </a:t>
+            </a:r>
+            <a:r>
+              <a:rPr lang="en-US" sz="2200" dirty="0" err="1" smtClean="0"/>
+              <a:t>mkdir</a:t>
+            </a:r>
+            <a:r>
+              <a:rPr lang="en-US" sz="2200" dirty="0" smtClean="0"/>
+              <a:t> &lt;new-folder1&gt; &lt;new-folder2&gt;…</a:t>
+            </a:r>
+          </a:p>
+          <a:p>
+            <a:pPr marL="0" lvl="1" indent="0">
+              <a:lnSpc>
+                <a:spcPct val="90000"/>
+              </a:lnSpc>
+              <a:buClr>
+                <a:schemeClr val="accent1"/>
+              </a:buClr>
+              <a:buNone/>
+            </a:pPr>
+            <a:r>
+              <a:rPr lang="en-US" altLang="zh-CN" sz="1600" dirty="0" smtClean="0"/>
+              <a:t>	</a:t>
+            </a:r>
+            <a:r>
+              <a:rPr lang="zh-CN" altLang="en-US" sz="1600" dirty="0" smtClean="0"/>
+              <a:t>新建</a:t>
+            </a:r>
+            <a:r>
+              <a:rPr lang="zh-CN" altLang="en-US" sz="1600" dirty="0"/>
+              <a:t>文件夹</a:t>
+            </a:r>
+            <a:endParaRPr lang="en-US" sz="1600" dirty="0"/>
+          </a:p>
+          <a:p>
+            <a:r>
+              <a:rPr lang="en-US" sz="2200" dirty="0"/>
+              <a:t>$ </a:t>
+            </a:r>
+            <a:r>
+              <a:rPr lang="en-US" sz="2200" dirty="0" err="1"/>
+              <a:t>rmdir</a:t>
+            </a:r>
+            <a:r>
+              <a:rPr lang="en-US" sz="2200" dirty="0"/>
+              <a:t> &lt;empty_folder_path1&gt; &lt;empty_folder_path2&gt;…</a:t>
+            </a:r>
+          </a:p>
+          <a:p>
+            <a:pPr marL="0" lvl="1" indent="0">
+              <a:buClr>
+                <a:schemeClr val="accent1"/>
+              </a:buClr>
+              <a:buNone/>
+            </a:pPr>
+            <a:r>
+              <a:rPr lang="en-US" altLang="zh-CN" sz="1600" dirty="0" smtClean="0"/>
+              <a:t>	</a:t>
+            </a:r>
+            <a:r>
+              <a:rPr lang="zh-CN" altLang="en-US" sz="1600" dirty="0" smtClean="0"/>
+              <a:t>删除</a:t>
+            </a:r>
+            <a:r>
+              <a:rPr lang="zh-CN" altLang="en-US" sz="1600" dirty="0"/>
+              <a:t>空文件夹</a:t>
+            </a:r>
+            <a:endParaRPr lang="en-US" sz="1600" dirty="0"/>
+          </a:p>
+          <a:p>
+            <a:r>
+              <a:rPr lang="en-US" sz="2200" dirty="0"/>
+              <a:t>$ </a:t>
+            </a:r>
+            <a:r>
+              <a:rPr lang="en-US" sz="2200" dirty="0" err="1"/>
+              <a:t>rm</a:t>
+            </a:r>
+            <a:r>
+              <a:rPr lang="en-US" sz="2200" dirty="0"/>
+              <a:t> -</a:t>
+            </a:r>
+            <a:r>
+              <a:rPr lang="en-US" sz="2200" dirty="0" err="1"/>
+              <a:t>rf</a:t>
+            </a:r>
+            <a:r>
+              <a:rPr lang="en-US" sz="2200" dirty="0"/>
+              <a:t> &lt;folder_path1&gt; &lt;folder_path2&gt;…</a:t>
+            </a:r>
+          </a:p>
+          <a:p>
+            <a:pPr marL="0" lvl="1" indent="0">
+              <a:buClr>
+                <a:schemeClr val="accent1"/>
+              </a:buClr>
+              <a:buNone/>
+            </a:pPr>
+            <a:r>
+              <a:rPr lang="en-US" altLang="zh-CN" sz="1600" dirty="0" smtClean="0"/>
+              <a:t>	</a:t>
+            </a:r>
+            <a:r>
+              <a:rPr lang="zh-CN" altLang="en-US" sz="1600" dirty="0" smtClean="0"/>
+              <a:t>删除</a:t>
+            </a:r>
+            <a:r>
+              <a:rPr lang="zh-CN" altLang="en-US" sz="1600" dirty="0"/>
+              <a:t>整个文件夹</a:t>
+            </a:r>
+            <a:endParaRPr lang="en-US" sz="1600" dirty="0"/>
+          </a:p>
+          <a:p>
+            <a:r>
+              <a:rPr lang="en-US" sz="2200" dirty="0"/>
+              <a:t>$ mv &lt;src_folder_path1&gt; &lt;src_folder_path2&gt;… &lt;</a:t>
+            </a:r>
+            <a:r>
+              <a:rPr lang="en-US" sz="2200" dirty="0" err="1"/>
+              <a:t>dest_path</a:t>
+            </a:r>
+            <a:r>
+              <a:rPr lang="en-US" sz="2200" dirty="0"/>
+              <a:t>&gt;</a:t>
+            </a:r>
+          </a:p>
+          <a:p>
+            <a:pPr marL="0" lvl="1" indent="0">
+              <a:lnSpc>
+                <a:spcPct val="90000"/>
+              </a:lnSpc>
+              <a:buClr>
+                <a:schemeClr val="accent1"/>
+              </a:buClr>
+              <a:buNone/>
+            </a:pPr>
+            <a:r>
+              <a:rPr lang="en-US" altLang="zh-CN" sz="1700" dirty="0" smtClean="0"/>
+              <a:t>	</a:t>
+            </a:r>
+            <a:r>
+              <a:rPr lang="zh-CN" altLang="en-US" sz="1700" dirty="0" smtClean="0"/>
+              <a:t>移动</a:t>
+            </a:r>
+            <a:r>
+              <a:rPr lang="zh-CN" altLang="en-US" sz="1700" dirty="0"/>
+              <a:t>文件夹，需要待移动的文件夹名称后面加</a:t>
+            </a:r>
+            <a:r>
+              <a:rPr lang="en-US" altLang="zh-CN" sz="1700" dirty="0"/>
+              <a:t>/</a:t>
+            </a:r>
+            <a:r>
+              <a:rPr lang="zh-CN" altLang="en-US" sz="1700" dirty="0"/>
+              <a:t>，表示移动的是文件夹</a:t>
+            </a:r>
+            <a:endParaRPr lang="en-US" sz="1700" dirty="0"/>
+          </a:p>
+          <a:p>
+            <a:r>
+              <a:rPr lang="en-US" sz="2200" dirty="0"/>
+              <a:t>$ mv &lt;</a:t>
+            </a:r>
+            <a:r>
+              <a:rPr lang="en-US" sz="2200" dirty="0" err="1"/>
+              <a:t>src_folder_path</a:t>
+            </a:r>
+            <a:r>
+              <a:rPr lang="en-US" sz="2200" dirty="0"/>
+              <a:t>&gt; &lt;</a:t>
+            </a:r>
+            <a:r>
+              <a:rPr lang="en-US" sz="2200" dirty="0" err="1"/>
+              <a:t>dest_folder_path</a:t>
+            </a:r>
+            <a:r>
+              <a:rPr lang="en-US" sz="2200" dirty="0"/>
+              <a:t>&gt;</a:t>
+            </a:r>
+          </a:p>
+          <a:p>
+            <a:pPr marL="0" lvl="1" indent="0">
+              <a:lnSpc>
+                <a:spcPct val="90000"/>
+              </a:lnSpc>
+              <a:buClr>
+                <a:schemeClr val="accent1"/>
+              </a:buClr>
+              <a:buNone/>
+            </a:pPr>
+            <a:r>
+              <a:rPr lang="en-US" altLang="zh-CN" sz="1700" dirty="0" smtClean="0"/>
+              <a:t>	</a:t>
+            </a:r>
+            <a:r>
+              <a:rPr lang="zh-CN" altLang="en-US" sz="1700" dirty="0" smtClean="0"/>
+              <a:t>重命名</a:t>
+            </a:r>
+            <a:r>
+              <a:rPr lang="zh-CN" altLang="en-US" sz="1700" dirty="0"/>
+              <a:t>文件夹</a:t>
+            </a:r>
+            <a:endParaRPr lang="en-US" sz="1700" dirty="0"/>
+          </a:p>
+          <a:p>
+            <a:pPr marL="0" indent="0">
+              <a:buNone/>
+            </a:pPr>
+            <a:r>
+              <a:rPr lang="en-US" altLang="zh-CN" sz="1700" dirty="0" smtClean="0"/>
+              <a:t>	m</a:t>
+            </a:r>
+            <a:r>
+              <a:rPr lang="en-US" sz="1700" dirty="0" smtClean="0"/>
+              <a:t>v</a:t>
+            </a:r>
+            <a:r>
+              <a:rPr lang="zh-CN" altLang="en-US" sz="1700" dirty="0" smtClean="0"/>
+              <a:t>命令中，如果文件夹路径不同就移动文件夹，如果文件夹名称不同就重命名</a:t>
+            </a:r>
+            <a:r>
+              <a:rPr lang="en-US" altLang="zh-CN" sz="1700" dirty="0" smtClean="0"/>
+              <a:t>	</a:t>
+            </a:r>
+            <a:r>
+              <a:rPr lang="zh-CN" altLang="en-US" sz="1700" dirty="0" smtClean="0"/>
+              <a:t>文件夹，两者均不同，就既移动文件夹同时也重命名文件夹</a:t>
+            </a:r>
+            <a:endParaRPr lang="en-US" sz="1700" dirty="0" smtClean="0"/>
+          </a:p>
+          <a:p>
+            <a:r>
+              <a:rPr lang="en-US" sz="2200" dirty="0"/>
+              <a:t>$ </a:t>
+            </a:r>
+            <a:r>
+              <a:rPr lang="en-US" sz="2200" dirty="0" err="1"/>
+              <a:t>cp</a:t>
+            </a:r>
+            <a:r>
+              <a:rPr lang="en-US" sz="2200" dirty="0"/>
+              <a:t> -r &lt;src_folder_path1&gt; &lt;src_folder_path2&gt;… &lt;</a:t>
+            </a:r>
+            <a:r>
+              <a:rPr lang="en-US" sz="2200" dirty="0" err="1"/>
+              <a:t>dest_path</a:t>
+            </a:r>
+            <a:r>
+              <a:rPr lang="en-US" sz="2200" dirty="0"/>
+              <a:t>&gt;</a:t>
+            </a:r>
+          </a:p>
+          <a:p>
+            <a:pPr marL="0" lvl="1" indent="0">
+              <a:buClr>
+                <a:schemeClr val="accent1"/>
+              </a:buClr>
+              <a:buNone/>
+            </a:pPr>
+            <a:r>
+              <a:rPr lang="en-US" altLang="zh-CN" sz="1700" dirty="0" smtClean="0"/>
+              <a:t>	</a:t>
+            </a:r>
+            <a:r>
+              <a:rPr lang="zh-CN" altLang="en-US" sz="1700" dirty="0" smtClean="0"/>
+              <a:t>复制</a:t>
+            </a:r>
+            <a:r>
+              <a:rPr lang="zh-CN" altLang="en-US" sz="1700" dirty="0"/>
+              <a:t>文件夹，需在文件夹名称后面加上</a:t>
+            </a:r>
+            <a:r>
+              <a:rPr lang="en-US" altLang="zh-CN" sz="1700" dirty="0"/>
+              <a:t>/</a:t>
+            </a:r>
+            <a:r>
+              <a:rPr lang="zh-CN" altLang="en-US" sz="1700" dirty="0"/>
+              <a:t>，表示复制的是一个文件夹，若待</a:t>
+            </a:r>
+            <a:r>
+              <a:rPr lang="zh-CN" altLang="en-US" sz="1700" dirty="0" smtClean="0"/>
+              <a:t>复制</a:t>
+            </a:r>
+            <a:r>
+              <a:rPr lang="en-US" altLang="zh-CN" sz="1700" dirty="0" smtClean="0"/>
+              <a:t>	</a:t>
+            </a:r>
+            <a:r>
+              <a:rPr lang="zh-CN" altLang="en-US" sz="1700" dirty="0" smtClean="0"/>
+              <a:t>文件夹</a:t>
+            </a:r>
+            <a:r>
+              <a:rPr lang="zh-CN" altLang="en-US" sz="1700" dirty="0"/>
+              <a:t>中还有子文件夹，需使用</a:t>
+            </a:r>
+            <a:r>
+              <a:rPr lang="en-US" altLang="zh-CN" sz="1700" dirty="0"/>
+              <a:t> -r </a:t>
+            </a:r>
+            <a:r>
+              <a:rPr lang="zh-CN" altLang="en-US" sz="1700" dirty="0"/>
+              <a:t>参数</a:t>
+            </a:r>
+            <a:r>
+              <a:rPr lang="zh-CN" altLang="en-US" sz="1700" dirty="0" smtClean="0"/>
+              <a:t>。复制同时可重命名。</a:t>
+            </a:r>
+            <a:endParaRPr lang="en-US" sz="1700" dirty="0"/>
+          </a:p>
+          <a:p>
             <a:endParaRPr lang="en-US" sz="2400" dirty="0"/>
           </a:p>
         </p:txBody>
@@ -25305,7 +26108,7 @@
     </p:spTree>
     <p:extLst>
       <p:ext uri="{BB962C8B-B14F-4D97-AF65-F5344CB8AC3E}">
-        <p14:creationId xmlns:p14="http://schemas.microsoft.com/office/powerpoint/2010/main" val="344385195"/>
+        <p14:creationId xmlns:p14="http://schemas.microsoft.com/office/powerpoint/2010/main" val="774482894"/>
       </p:ext>
     </p:extLst>
   </p:cSld>
@@ -25407,7 +26210,207 @@
           <a:chExt cx="0" cy="0"/>
         </a:xfrm>
       </p:grpSpPr>
+      <p:sp>
+        <p:nvSpPr>
+          <p:cNvPr id="2" name="標題 1"/>
+          <p:cNvSpPr>
+            <a:spLocks noGrp="1"/>
+          </p:cNvSpPr>
+          <p:nvPr>
+            <p:ph type="title"/>
+          </p:nvPr>
+        </p:nvSpPr>
+        <p:spPr/>
+        <p:txBody>
+          <a:bodyPr>
+            <a:normAutofit fontScale="90000"/>
+          </a:bodyPr>
+          <a:lstStyle/>
+          <a:p>
+            <a:endParaRPr lang="en-US" dirty="0">
+              <a:latin typeface="微軟正黑體" pitchFamily="34" charset="-120"/>
+              <a:ea typeface="微軟正黑體" pitchFamily="34" charset="-120"/>
+            </a:endParaRPr>
+          </a:p>
+        </p:txBody>
+      </p:sp>
+      <p:sp>
+        <p:nvSpPr>
+          <p:cNvPr id="3" name="內容版面配置區 2"/>
+          <p:cNvSpPr>
+            <a:spLocks noGrp="1"/>
+          </p:cNvSpPr>
+          <p:nvPr>
+            <p:ph sz="quarter" idx="13"/>
+          </p:nvPr>
+        </p:nvSpPr>
+        <p:spPr/>
+        <p:txBody>
+          <a:bodyPr>
+            <a:normAutofit/>
+          </a:bodyPr>
+          <a:lstStyle/>
+          <a:p>
+            <a:endParaRPr lang="en-US" sz="2400" dirty="0"/>
+          </a:p>
+        </p:txBody>
+      </p:sp>
     </p:spTree>
+    <p:extLst>
+      <p:ext uri="{BB962C8B-B14F-4D97-AF65-F5344CB8AC3E}">
+        <p14:creationId xmlns:p14="http://schemas.microsoft.com/office/powerpoint/2010/main" val="3106315989"/>
+      </p:ext>
+    </p:extLst>
+  </p:cSld>
+  <p:clrMapOvr>
+    <a:masterClrMapping/>
+  </p:clrMapOvr>
+</p:sld>
+</file>
+
+<file path=ppt/slides/slide8.xml><?xml version="1.0" encoding="utf-8"?>
+<p:sld xmlns:a="http://schemas.openxmlformats.org/drawingml/2006/main" xmlns:r="http://schemas.openxmlformats.org/officeDocument/2006/relationships" xmlns:p="http://schemas.openxmlformats.org/presentationml/2006/main">
+  <p:cSld>
+    <p:spTree>
+      <p:nvGrpSpPr>
+        <p:cNvPr id="1" name=""/>
+        <p:cNvGrpSpPr/>
+        <p:nvPr/>
+      </p:nvGrpSpPr>
+      <p:grpSpPr>
+        <a:xfrm>
+          <a:off x="0" y="0"/>
+          <a:ext cx="0" cy="0"/>
+          <a:chOff x="0" y="0"/>
+          <a:chExt cx="0" cy="0"/>
+        </a:xfrm>
+      </p:grpSpPr>
+      <p:sp>
+        <p:nvSpPr>
+          <p:cNvPr id="2" name="標題 1"/>
+          <p:cNvSpPr>
+            <a:spLocks noGrp="1"/>
+          </p:cNvSpPr>
+          <p:nvPr>
+            <p:ph type="title"/>
+          </p:nvPr>
+        </p:nvSpPr>
+        <p:spPr/>
+        <p:txBody>
+          <a:bodyPr>
+            <a:normAutofit fontScale="90000"/>
+          </a:bodyPr>
+          <a:lstStyle/>
+          <a:p>
+            <a:endParaRPr lang="en-US" dirty="0">
+              <a:latin typeface="微軟正黑體" pitchFamily="34" charset="-120"/>
+              <a:ea typeface="微軟正黑體" pitchFamily="34" charset="-120"/>
+            </a:endParaRPr>
+          </a:p>
+        </p:txBody>
+      </p:sp>
+      <p:sp>
+        <p:nvSpPr>
+          <p:cNvPr id="3" name="內容版面配置區 2"/>
+          <p:cNvSpPr>
+            <a:spLocks noGrp="1"/>
+          </p:cNvSpPr>
+          <p:nvPr>
+            <p:ph sz="quarter" idx="13"/>
+          </p:nvPr>
+        </p:nvSpPr>
+        <p:spPr/>
+        <p:txBody>
+          <a:bodyPr>
+            <a:normAutofit/>
+          </a:bodyPr>
+          <a:lstStyle/>
+          <a:p>
+            <a:endParaRPr lang="en-US" sz="2400" dirty="0"/>
+          </a:p>
+        </p:txBody>
+      </p:sp>
+    </p:spTree>
+    <p:extLst>
+      <p:ext uri="{BB962C8B-B14F-4D97-AF65-F5344CB8AC3E}">
+        <p14:creationId xmlns:p14="http://schemas.microsoft.com/office/powerpoint/2010/main" val="1967143576"/>
+      </p:ext>
+    </p:extLst>
+  </p:cSld>
+  <p:clrMapOvr>
+    <a:masterClrMapping/>
+  </p:clrMapOvr>
+</p:sld>
+</file>
+
+<file path=ppt/slides/slide9.xml><?xml version="1.0" encoding="utf-8"?>
+<p:sld xmlns:a="http://schemas.openxmlformats.org/drawingml/2006/main" xmlns:r="http://schemas.openxmlformats.org/officeDocument/2006/relationships" xmlns:p="http://schemas.openxmlformats.org/presentationml/2006/main">
+  <p:cSld>
+    <p:spTree>
+      <p:nvGrpSpPr>
+        <p:cNvPr id="1" name=""/>
+        <p:cNvGrpSpPr/>
+        <p:nvPr/>
+      </p:nvGrpSpPr>
+      <p:grpSpPr>
+        <a:xfrm>
+          <a:off x="0" y="0"/>
+          <a:ext cx="0" cy="0"/>
+          <a:chOff x="0" y="0"/>
+          <a:chExt cx="0" cy="0"/>
+        </a:xfrm>
+      </p:grpSpPr>
+      <p:sp>
+        <p:nvSpPr>
+          <p:cNvPr id="2" name="標題 1"/>
+          <p:cNvSpPr>
+            <a:spLocks noGrp="1"/>
+          </p:cNvSpPr>
+          <p:nvPr>
+            <p:ph type="title"/>
+          </p:nvPr>
+        </p:nvSpPr>
+        <p:spPr/>
+        <p:txBody>
+          <a:bodyPr>
+            <a:normAutofit fontScale="90000"/>
+          </a:bodyPr>
+          <a:lstStyle/>
+          <a:p>
+            <a:endParaRPr lang="en-US" dirty="0">
+              <a:latin typeface="微軟正黑體" pitchFamily="34" charset="-120"/>
+              <a:ea typeface="微軟正黑體" pitchFamily="34" charset="-120"/>
+            </a:endParaRPr>
+          </a:p>
+        </p:txBody>
+      </p:sp>
+      <p:sp>
+        <p:nvSpPr>
+          <p:cNvPr id="3" name="內容版面配置區 2"/>
+          <p:cNvSpPr>
+            <a:spLocks noGrp="1"/>
+          </p:cNvSpPr>
+          <p:nvPr>
+            <p:ph sz="quarter" idx="13"/>
+          </p:nvPr>
+        </p:nvSpPr>
+        <p:spPr/>
+        <p:txBody>
+          <a:bodyPr>
+            <a:normAutofit/>
+          </a:bodyPr>
+          <a:lstStyle/>
+          <a:p>
+            <a:endParaRPr lang="en-US" sz="2400" dirty="0"/>
+          </a:p>
+        </p:txBody>
+      </p:sp>
+    </p:spTree>
+    <p:extLst>
+      <p:ext uri="{BB962C8B-B14F-4D97-AF65-F5344CB8AC3E}">
+        <p14:creationId xmlns:p14="http://schemas.microsoft.com/office/powerpoint/2010/main" val="3519063801"/>
+      </p:ext>
+    </p:extLst>
   </p:cSld>
   <p:clrMapOvr>
     <a:masterClrMapping/>

</xml_diff>

<commit_message>
just update the file
</commit_message>
<xml_diff>
--- a/linux/linux_cmd.pptx
+++ b/linux/linux_cmd.pptx
@@ -231,7 +231,7 @@
             <a:fld id="{1D1B987F-03B8-4DD3-B82B-E020EAD409CF}" type="datetimeFigureOut">
               <a:rPr lang="en-US" smtClean="0"/>
               <a:pPr/>
-              <a:t>6/29/2017</a:t>
+              <a:t>7/5/2017</a:t>
             </a:fld>
             <a:endParaRPr lang="en-US"/>
           </a:p>
@@ -1005,7 +1005,7 @@
             <a:fld id="{CA0C6ED6-D0B9-4DC5-B1AE-C5D4014C8E49}" type="datetimeFigureOut">
               <a:rPr lang="en-US" smtClean="0"/>
               <a:pPr/>
-              <a:t>6/29/2017</a:t>
+              <a:t>7/5/2017</a:t>
             </a:fld>
             <a:endParaRPr lang="en-US"/>
           </a:p>
@@ -1211,7 +1211,7 @@
             <a:fld id="{CA0C6ED6-D0B9-4DC5-B1AE-C5D4014C8E49}" type="datetimeFigureOut">
               <a:rPr lang="en-US" smtClean="0"/>
               <a:pPr/>
-              <a:t>6/29/2017</a:t>
+              <a:t>7/5/2017</a:t>
             </a:fld>
             <a:endParaRPr lang="en-US"/>
           </a:p>
@@ -1864,7 +1864,7 @@
             <a:fld id="{0C77BFF5-5A0A-BB4B-8F6E-6841FAB046BE}" type="datetime1">
               <a:rPr lang="sv-SE" smtClean="0"/>
               <a:pPr/>
-              <a:t>2017-06-29</a:t>
+              <a:t>2017-07-05</a:t>
             </a:fld>
             <a:endParaRPr lang="en-US" dirty="0"/>
           </a:p>
@@ -2099,7 +2099,7 @@
             <a:fld id="{E41408AA-8272-574B-9552-0B998EC66E8E}" type="datetime1">
               <a:rPr lang="sv-SE" smtClean="0"/>
               <a:pPr/>
-              <a:t>2017-06-29</a:t>
+              <a:t>2017-07-05</a:t>
             </a:fld>
             <a:endParaRPr lang="en-US" dirty="0"/>
           </a:p>
@@ -2410,7 +2410,7 @@
             <a:fld id="{953A9D4A-E8FA-104F-802A-4562FEF196FD}" type="datetime1">
               <a:rPr lang="sv-SE" smtClean="0"/>
               <a:pPr/>
-              <a:t>2017-06-29</a:t>
+              <a:t>2017-07-05</a:t>
             </a:fld>
             <a:endParaRPr lang="en-US" dirty="0"/>
           </a:p>
@@ -2763,7 +2763,7 @@
             <a:fld id="{953A9D4A-E8FA-104F-802A-4562FEF196FD}" type="datetime1">
               <a:rPr lang="sv-SE" smtClean="0"/>
               <a:pPr/>
-              <a:t>2017-06-29</a:t>
+              <a:t>2017-07-05</a:t>
             </a:fld>
             <a:endParaRPr lang="en-US" dirty="0"/>
           </a:p>
@@ -3250,7 +3250,7 @@
             <a:fld id="{953A9D4A-E8FA-104F-802A-4562FEF196FD}" type="datetime1">
               <a:rPr lang="sv-SE" smtClean="0"/>
               <a:pPr/>
-              <a:t>2017-06-29</a:t>
+              <a:t>2017-07-05</a:t>
             </a:fld>
             <a:endParaRPr lang="en-US" dirty="0"/>
           </a:p>
@@ -3433,7 +3433,7 @@
             <a:fld id="{953A9D4A-E8FA-104F-802A-4562FEF196FD}" type="datetime1">
               <a:rPr lang="sv-SE" smtClean="0"/>
               <a:pPr/>
-              <a:t>2017-06-29</a:t>
+              <a:t>2017-07-05</a:t>
             </a:fld>
             <a:endParaRPr lang="en-US" dirty="0"/>
           </a:p>
@@ -3593,7 +3593,7 @@
             <a:fld id="{953A9D4A-E8FA-104F-802A-4562FEF196FD}" type="datetime1">
               <a:rPr lang="sv-SE" smtClean="0"/>
               <a:pPr/>
-              <a:t>2017-06-29</a:t>
+              <a:t>2017-07-05</a:t>
             </a:fld>
             <a:endParaRPr lang="en-US" dirty="0"/>
           </a:p>
@@ -3845,7 +3845,7 @@
             <a:fld id="{CA0C6ED6-D0B9-4DC5-B1AE-C5D4014C8E49}" type="datetimeFigureOut">
               <a:rPr lang="en-US" smtClean="0"/>
               <a:pPr/>
-              <a:t>6/29/2017</a:t>
+              <a:t>7/5/2017</a:t>
             </a:fld>
             <a:endParaRPr lang="en-US"/>
           </a:p>
@@ -4163,7 +4163,7 @@
             <a:fld id="{953A9D4A-E8FA-104F-802A-4562FEF196FD}" type="datetime1">
               <a:rPr lang="sv-SE" smtClean="0"/>
               <a:pPr/>
-              <a:t>2017-06-29</a:t>
+              <a:t>2017-07-05</a:t>
             </a:fld>
             <a:endParaRPr lang="en-US" dirty="0"/>
           </a:p>
@@ -4485,7 +4485,7 @@
             <a:fld id="{953A9D4A-E8FA-104F-802A-4562FEF196FD}" type="datetime1">
               <a:rPr lang="sv-SE" smtClean="0"/>
               <a:pPr/>
-              <a:t>2017-06-29</a:t>
+              <a:t>2017-07-05</a:t>
             </a:fld>
             <a:endParaRPr lang="en-US" dirty="0"/>
           </a:p>
@@ -4720,7 +4720,7 @@
             <a:fld id="{953A9D4A-E8FA-104F-802A-4562FEF196FD}" type="datetime1">
               <a:rPr lang="sv-SE" smtClean="0"/>
               <a:pPr/>
-              <a:t>2017-06-29</a:t>
+              <a:t>2017-07-05</a:t>
             </a:fld>
             <a:endParaRPr lang="en-US" dirty="0"/>
           </a:p>
@@ -4965,7 +4965,7 @@
             <a:fld id="{953A9D4A-E8FA-104F-802A-4562FEF196FD}" type="datetime1">
               <a:rPr lang="sv-SE" smtClean="0"/>
               <a:pPr/>
-              <a:t>2017-06-29</a:t>
+              <a:t>2017-07-05</a:t>
             </a:fld>
             <a:endParaRPr lang="en-US" dirty="0"/>
           </a:p>
@@ -5572,14 +5572,14 @@
           <a:effectLst/>
           <a:extLst>
             <a:ext uri="{909E8E84-426E-40dd-AFC4-6F175D3DCCD1}">
-              <a14:hiddenFill xmlns:a14="http://schemas.microsoft.com/office/drawing/2010/main" xmlns="">
+              <a14:hiddenFill xmlns="" xmlns:a14="http://schemas.microsoft.com/office/drawing/2010/main">
                 <a:solidFill>
                   <a:schemeClr val="accent1"/>
                 </a:solidFill>
               </a14:hiddenFill>
             </a:ext>
             <a:ext uri="{91240B29-F687-4f45-9708-019B960494DF}">
-              <a14:hiddenLine xmlns:a14="http://schemas.microsoft.com/office/drawing/2010/main" xmlns="" w="9525">
+              <a14:hiddenLine xmlns="" xmlns:a14="http://schemas.microsoft.com/office/drawing/2010/main" w="9525">
                 <a:solidFill>
                   <a:schemeClr val="tx1"/>
                 </a:solidFill>
@@ -5589,7 +5589,7 @@
               </a14:hiddenLine>
             </a:ext>
             <a:ext uri="{AF507438-7753-43e0-B8FC-AC1667EBCBE1}">
-              <a14:hiddenEffects xmlns:a14="http://schemas.microsoft.com/office/drawing/2010/main" xmlns="">
+              <a14:hiddenEffects xmlns="" xmlns:a14="http://schemas.microsoft.com/office/drawing/2010/main">
                 <a:effectLst>
                   <a:outerShdw blurRad="63500" dist="38099" dir="2700000" algn="ctr" rotWithShape="0">
                     <a:schemeClr val="bg2">
@@ -5767,7 +5767,7 @@
             <a:fld id="{CA0C6ED6-D0B9-4DC5-B1AE-C5D4014C8E49}" type="datetimeFigureOut">
               <a:rPr lang="en-US" smtClean="0"/>
               <a:pPr/>
-              <a:t>6/29/2017</a:t>
+              <a:t>7/5/2017</a:t>
             </a:fld>
             <a:endParaRPr lang="en-US"/>
           </a:p>
@@ -6108,7 +6108,7 @@
             <a:fld id="{CA0C6ED6-D0B9-4DC5-B1AE-C5D4014C8E49}" type="datetimeFigureOut">
               <a:rPr lang="en-US" smtClean="0"/>
               <a:pPr/>
-              <a:t>6/29/2017</a:t>
+              <a:t>7/5/2017</a:t>
             </a:fld>
             <a:endParaRPr lang="en-US"/>
           </a:p>
@@ -6458,7 +6458,7 @@
             <a:fld id="{CA0C6ED6-D0B9-4DC5-B1AE-C5D4014C8E49}" type="datetimeFigureOut">
               <a:rPr lang="en-US" smtClean="0"/>
               <a:pPr/>
-              <a:t>6/29/2017</a:t>
+              <a:t>7/5/2017</a:t>
             </a:fld>
             <a:endParaRPr lang="en-US"/>
           </a:p>
@@ -6956,7 +6956,7 @@
             <a:fld id="{CA0C6ED6-D0B9-4DC5-B1AE-C5D4014C8E49}" type="datetimeFigureOut">
               <a:rPr lang="en-US" smtClean="0"/>
               <a:pPr/>
-              <a:t>6/29/2017</a:t>
+              <a:t>7/5/2017</a:t>
             </a:fld>
             <a:endParaRPr lang="en-US"/>
           </a:p>
@@ -7230,7 +7230,7 @@
             <a:fld id="{CA0C6ED6-D0B9-4DC5-B1AE-C5D4014C8E49}" type="datetimeFigureOut">
               <a:rPr lang="en-US" smtClean="0"/>
               <a:pPr/>
-              <a:t>6/29/2017</a:t>
+              <a:t>7/5/2017</a:t>
             </a:fld>
             <a:endParaRPr lang="en-US"/>
           </a:p>
@@ -7374,7 +7374,7 @@
             <a:fld id="{CA0C6ED6-D0B9-4DC5-B1AE-C5D4014C8E49}" type="datetimeFigureOut">
               <a:rPr lang="en-US" smtClean="0"/>
               <a:pPr/>
-              <a:t>6/29/2017</a:t>
+              <a:t>7/5/2017</a:t>
             </a:fld>
             <a:endParaRPr lang="en-US"/>
           </a:p>
@@ -7495,7 +7495,7 @@
             <a:fld id="{CA0C6ED6-D0B9-4DC5-B1AE-C5D4014C8E49}" type="datetimeFigureOut">
               <a:rPr lang="en-US" smtClean="0"/>
               <a:pPr/>
-              <a:t>6/29/2017</a:t>
+              <a:t>7/5/2017</a:t>
             </a:fld>
             <a:endParaRPr lang="en-US"/>
           </a:p>
@@ -7814,7 +7814,7 @@
             <a:fld id="{CA0C6ED6-D0B9-4DC5-B1AE-C5D4014C8E49}" type="datetimeFigureOut">
               <a:rPr lang="en-US" smtClean="0"/>
               <a:pPr/>
-              <a:t>6/29/2017</a:t>
+              <a:t>7/5/2017</a:t>
             </a:fld>
             <a:endParaRPr lang="en-US"/>
           </a:p>
@@ -8107,7 +8107,7 @@
             <a:fld id="{CA0C6ED6-D0B9-4DC5-B1AE-C5D4014C8E49}" type="datetimeFigureOut">
               <a:rPr lang="en-US" smtClean="0"/>
               <a:pPr/>
-              <a:t>6/29/2017</a:t>
+              <a:t>7/5/2017</a:t>
             </a:fld>
             <a:endParaRPr lang="en-US"/>
           </a:p>
@@ -8319,7 +8319,7 @@
             <a:fld id="{CA0C6ED6-D0B9-4DC5-B1AE-C5D4014C8E49}" type="datetimeFigureOut">
               <a:rPr lang="en-US" smtClean="0"/>
               <a:pPr/>
-              <a:t>6/29/2017</a:t>
+              <a:t>7/5/2017</a:t>
             </a:fld>
             <a:endParaRPr lang="en-US"/>
           </a:p>
@@ -8528,7 +8528,7 @@
             <a:fld id="{CA0C6ED6-D0B9-4DC5-B1AE-C5D4014C8E49}" type="datetimeFigureOut">
               <a:rPr lang="en-US" smtClean="0"/>
               <a:pPr/>
-              <a:t>6/29/2017</a:t>
+              <a:t>7/5/2017</a:t>
             </a:fld>
             <a:endParaRPr lang="en-US"/>
           </a:p>
@@ -9107,14 +9107,14 @@
           <a:effectLst/>
           <a:extLst>
             <a:ext uri="{909E8E84-426E-40dd-AFC4-6F175D3DCCD1}">
-              <a14:hiddenFill xmlns:a14="http://schemas.microsoft.com/office/drawing/2010/main" xmlns="">
+              <a14:hiddenFill xmlns="" xmlns:a14="http://schemas.microsoft.com/office/drawing/2010/main">
                 <a:solidFill>
                   <a:schemeClr val="accent1"/>
                 </a:solidFill>
               </a14:hiddenFill>
             </a:ext>
             <a:ext uri="{91240B29-F687-4f45-9708-019B960494DF}">
-              <a14:hiddenLine xmlns:a14="http://schemas.microsoft.com/office/drawing/2010/main" xmlns="" w="9525">
+              <a14:hiddenLine xmlns="" xmlns:a14="http://schemas.microsoft.com/office/drawing/2010/main" w="9525">
                 <a:solidFill>
                   <a:schemeClr val="tx1"/>
                 </a:solidFill>
@@ -9124,7 +9124,7 @@
               </a14:hiddenLine>
             </a:ext>
             <a:ext uri="{AF507438-7753-43e0-B8FC-AC1667EBCBE1}">
-              <a14:hiddenEffects xmlns:a14="http://schemas.microsoft.com/office/drawing/2010/main" xmlns="">
+              <a14:hiddenEffects xmlns="" xmlns:a14="http://schemas.microsoft.com/office/drawing/2010/main">
                 <a:effectLst>
                   <a:outerShdw blurRad="63500" dist="38099" dir="2700000" algn="ctr" rotWithShape="0">
                     <a:schemeClr val="bg2">
@@ -10023,7 +10023,7 @@
             <a:fld id="{CA0C6ED6-D0B9-4DC5-B1AE-C5D4014C8E49}" type="datetimeFigureOut">
               <a:rPr lang="en-US" smtClean="0"/>
               <a:pPr/>
-              <a:t>6/29/2017</a:t>
+              <a:t>7/5/2017</a:t>
             </a:fld>
             <a:endParaRPr lang="en-US"/>
           </a:p>
@@ -12872,14 +12872,14 @@
           <a:effectLst/>
           <a:extLst>
             <a:ext uri="{909E8E84-426E-40dd-AFC4-6F175D3DCCD1}">
-              <a14:hiddenFill xmlns="" xmlns:a14="http://schemas.microsoft.com/office/drawing/2010/main">
+              <a14:hiddenFill xmlns:a14="http://schemas.microsoft.com/office/drawing/2010/main" xmlns="">
                 <a:solidFill>
                   <a:schemeClr val="accent1"/>
                 </a:solidFill>
               </a14:hiddenFill>
             </a:ext>
             <a:ext uri="{91240B29-F687-4f45-9708-019B960494DF}">
-              <a14:hiddenLine xmlns="" xmlns:a14="http://schemas.microsoft.com/office/drawing/2010/main" w="9525">
+              <a14:hiddenLine xmlns:a14="http://schemas.microsoft.com/office/drawing/2010/main" xmlns="" w="9525">
                 <a:solidFill>
                   <a:schemeClr val="tx1"/>
                 </a:solidFill>
@@ -12889,7 +12889,7 @@
               </a14:hiddenLine>
             </a:ext>
             <a:ext uri="{AF507438-7753-43e0-B8FC-AC1667EBCBE1}">
-              <a14:hiddenEffects xmlns="" xmlns:a14="http://schemas.microsoft.com/office/drawing/2010/main">
+              <a14:hiddenEffects xmlns:a14="http://schemas.microsoft.com/office/drawing/2010/main" xmlns="">
                 <a:effectLst>
                   <a:outerShdw blurRad="63500" dist="38099" dir="2700000" algn="ctr" rotWithShape="0">
                     <a:schemeClr val="bg2">
@@ -13386,7 +13386,7 @@
             <a:fld id="{CA0C6ED6-D0B9-4DC5-B1AE-C5D4014C8E49}" type="datetimeFigureOut">
               <a:rPr lang="en-US" smtClean="0"/>
               <a:pPr/>
-              <a:t>6/29/2017</a:t>
+              <a:t>7/5/2017</a:t>
             </a:fld>
             <a:endParaRPr lang="en-US"/>
           </a:p>
@@ -13543,7 +13543,7 @@
             <a:fld id="{CA0C6ED6-D0B9-4DC5-B1AE-C5D4014C8E49}" type="datetimeFigureOut">
               <a:rPr lang="en-US" smtClean="0"/>
               <a:pPr/>
-              <a:t>6/29/2017</a:t>
+              <a:t>7/5/2017</a:t>
             </a:fld>
             <a:endParaRPr lang="en-US"/>
           </a:p>
@@ -13884,7 +13884,7 @@
             <a:fld id="{CA0C6ED6-D0B9-4DC5-B1AE-C5D4014C8E49}" type="datetimeFigureOut">
               <a:rPr lang="en-US" smtClean="0"/>
               <a:pPr/>
-              <a:t>6/29/2017</a:t>
+              <a:t>7/5/2017</a:t>
             </a:fld>
             <a:endParaRPr lang="en-US"/>
           </a:p>
@@ -14234,7 +14234,7 @@
             <a:fld id="{CA0C6ED6-D0B9-4DC5-B1AE-C5D4014C8E49}" type="datetimeFigureOut">
               <a:rPr lang="en-US" smtClean="0"/>
               <a:pPr/>
-              <a:t>6/29/2017</a:t>
+              <a:t>7/5/2017</a:t>
             </a:fld>
             <a:endParaRPr lang="en-US"/>
           </a:p>
@@ -14732,7 +14732,7 @@
             <a:fld id="{CA0C6ED6-D0B9-4DC5-B1AE-C5D4014C8E49}" type="datetimeFigureOut">
               <a:rPr lang="en-US" smtClean="0"/>
               <a:pPr/>
-              <a:t>6/29/2017</a:t>
+              <a:t>7/5/2017</a:t>
             </a:fld>
             <a:endParaRPr lang="en-US"/>
           </a:p>
@@ -14876,7 +14876,7 @@
             <a:fld id="{CA0C6ED6-D0B9-4DC5-B1AE-C5D4014C8E49}" type="datetimeFigureOut">
               <a:rPr lang="en-US" smtClean="0"/>
               <a:pPr/>
-              <a:t>6/29/2017</a:t>
+              <a:t>7/5/2017</a:t>
             </a:fld>
             <a:endParaRPr lang="en-US"/>
           </a:p>
@@ -14997,7 +14997,7 @@
             <a:fld id="{CA0C6ED6-D0B9-4DC5-B1AE-C5D4014C8E49}" type="datetimeFigureOut">
               <a:rPr lang="en-US" smtClean="0"/>
               <a:pPr/>
-              <a:t>6/29/2017</a:t>
+              <a:t>7/5/2017</a:t>
             </a:fld>
             <a:endParaRPr lang="en-US"/>
           </a:p>
@@ -15316,7 +15316,7 @@
             <a:fld id="{CA0C6ED6-D0B9-4DC5-B1AE-C5D4014C8E49}" type="datetimeFigureOut">
               <a:rPr lang="en-US" smtClean="0"/>
               <a:pPr/>
-              <a:t>6/29/2017</a:t>
+              <a:t>7/5/2017</a:t>
             </a:fld>
             <a:endParaRPr lang="en-US"/>
           </a:p>
@@ -15609,7 +15609,7 @@
             <a:fld id="{CA0C6ED6-D0B9-4DC5-B1AE-C5D4014C8E49}" type="datetimeFigureOut">
               <a:rPr lang="en-US" smtClean="0"/>
               <a:pPr/>
-              <a:t>6/29/2017</a:t>
+              <a:t>7/5/2017</a:t>
             </a:fld>
             <a:endParaRPr lang="en-US"/>
           </a:p>
@@ -15821,7 +15821,7 @@
             <a:fld id="{CA0C6ED6-D0B9-4DC5-B1AE-C5D4014C8E49}" type="datetimeFigureOut">
               <a:rPr lang="en-US" smtClean="0"/>
               <a:pPr/>
-              <a:t>6/29/2017</a:t>
+              <a:t>7/5/2017</a:t>
             </a:fld>
             <a:endParaRPr lang="en-US"/>
           </a:p>
@@ -16030,7 +16030,7 @@
             <a:fld id="{CA0C6ED6-D0B9-4DC5-B1AE-C5D4014C8E49}" type="datetimeFigureOut">
               <a:rPr lang="en-US" smtClean="0"/>
               <a:pPr/>
-              <a:t>6/29/2017</a:t>
+              <a:t>7/5/2017</a:t>
             </a:fld>
             <a:endParaRPr lang="en-US"/>
           </a:p>
@@ -16174,7 +16174,7 @@
             <a:fld id="{CA0C6ED6-D0B9-4DC5-B1AE-C5D4014C8E49}" type="datetimeFigureOut">
               <a:rPr lang="en-US" smtClean="0"/>
               <a:pPr/>
-              <a:t>6/29/2017</a:t>
+              <a:t>7/5/2017</a:t>
             </a:fld>
             <a:endParaRPr lang="en-US"/>
           </a:p>
@@ -16622,14 +16622,14 @@
           <a:effectLst/>
           <a:extLst>
             <a:ext uri="{909E8E84-426E-40dd-AFC4-6F175D3DCCD1}">
-              <a14:hiddenFill xmlns="" xmlns:a14="http://schemas.microsoft.com/office/drawing/2010/main">
+              <a14:hiddenFill xmlns:a14="http://schemas.microsoft.com/office/drawing/2010/main" xmlns="">
                 <a:solidFill>
                   <a:schemeClr val="accent1"/>
                 </a:solidFill>
               </a14:hiddenFill>
             </a:ext>
             <a:ext uri="{91240B29-F687-4f45-9708-019B960494DF}">
-              <a14:hiddenLine xmlns="" xmlns:a14="http://schemas.microsoft.com/office/drawing/2010/main" w="9525">
+              <a14:hiddenLine xmlns:a14="http://schemas.microsoft.com/office/drawing/2010/main" xmlns="" w="9525">
                 <a:solidFill>
                   <a:schemeClr val="tx1"/>
                 </a:solidFill>
@@ -16639,7 +16639,7 @@
               </a14:hiddenLine>
             </a:ext>
             <a:ext uri="{AF507438-7753-43e0-B8FC-AC1667EBCBE1}">
-              <a14:hiddenEffects xmlns="" xmlns:a14="http://schemas.microsoft.com/office/drawing/2010/main">
+              <a14:hiddenEffects xmlns:a14="http://schemas.microsoft.com/office/drawing/2010/main" xmlns="">
                 <a:effectLst>
                   <a:outerShdw blurRad="63500" dist="38099" dir="2700000" algn="ctr" rotWithShape="0">
                     <a:schemeClr val="bg2">
@@ -19103,7 +19103,7 @@
             <a:fld id="{CA0C6ED6-D0B9-4DC5-B1AE-C5D4014C8E49}" type="datetimeFigureOut">
               <a:rPr lang="en-US" smtClean="0"/>
               <a:pPr/>
-              <a:t>6/29/2017</a:t>
+              <a:t>7/5/2017</a:t>
             </a:fld>
             <a:endParaRPr lang="en-US"/>
           </a:p>
@@ -19873,7 +19873,7 @@
             <a:fld id="{CA0C6ED6-D0B9-4DC5-B1AE-C5D4014C8E49}" type="datetimeFigureOut">
               <a:rPr lang="en-US" smtClean="0"/>
               <a:pPr/>
-              <a:t>6/29/2017</a:t>
+              <a:t>7/5/2017</a:t>
             </a:fld>
             <a:endParaRPr lang="en-US"/>
           </a:p>
@@ -20160,7 +20160,7 @@
             <a:fld id="{CA0C6ED6-D0B9-4DC5-B1AE-C5D4014C8E49}" type="datetimeFigureOut">
               <a:rPr lang="en-US" smtClean="0"/>
               <a:pPr/>
-              <a:t>6/29/2017</a:t>
+              <a:t>7/5/2017</a:t>
             </a:fld>
             <a:endParaRPr lang="en-US"/>
           </a:p>
@@ -20392,7 +20392,7 @@
             <a:fld id="{CA0C6ED6-D0B9-4DC5-B1AE-C5D4014C8E49}" type="datetimeFigureOut">
               <a:rPr lang="en-US" smtClean="0"/>
               <a:pPr/>
-              <a:t>6/29/2017</a:t>
+              <a:t>7/5/2017</a:t>
             </a:fld>
             <a:endParaRPr lang="en-US"/>
           </a:p>
@@ -21075,7 +21075,7 @@
             <a:fld id="{770BDA4A-776A-4546-918F-32281E291F21}" type="datetime1">
               <a:rPr lang="sv-SE" smtClean="0"/>
               <a:pPr/>
-              <a:t>2017-06-29</a:t>
+              <a:t>2017-07-05</a:t>
             </a:fld>
             <a:endParaRPr lang="en-US" dirty="0"/>
           </a:p>
@@ -21695,7 +21695,7 @@
             <a:fld id="{CA0C6ED6-D0B9-4DC5-B1AE-C5D4014C8E49}" type="datetimeFigureOut">
               <a:rPr lang="en-US" smtClean="0"/>
               <a:pPr/>
-              <a:t>6/29/2017</a:t>
+              <a:t>7/5/2017</a:t>
             </a:fld>
             <a:endParaRPr lang="en-US"/>
           </a:p>
@@ -23058,7 +23058,7 @@
             <a:fld id="{CA0C6ED6-D0B9-4DC5-B1AE-C5D4014C8E49}" type="datetimeFigureOut">
               <a:rPr lang="en-US" smtClean="0"/>
               <a:pPr/>
-              <a:t>6/29/2017</a:t>
+              <a:t>7/5/2017</a:t>
             </a:fld>
             <a:endParaRPr lang="en-US"/>
           </a:p>
@@ -25143,7 +25143,7 @@
         <p:spPr/>
         <p:txBody>
           <a:bodyPr>
-            <a:normAutofit fontScale="92500" lnSpcReduction="10000"/>
+            <a:normAutofit fontScale="77500" lnSpcReduction="20000"/>
           </a:bodyPr>
           <a:lstStyle/>
           <a:p>
@@ -25197,11 +25197,7 @@
           <a:p>
             <a:r>
               <a:rPr lang="en-US" dirty="0" smtClean="0"/>
-              <a:t>$</a:t>
-            </a:r>
-            <a:r>
-              <a:rPr lang="en-US" dirty="0" smtClean="0"/>
-              <a:t>cat readme.txt</a:t>
+              <a:t>$cat readme.txt</a:t>
             </a:r>
           </a:p>
           <a:p>
@@ -25236,7 +25232,11 @@
             </a:r>
             <a:r>
               <a:rPr lang="zh-CN" altLang="en-US" dirty="0" smtClean="0"/>
-              <a:t>查看文件读写权限</a:t>
+              <a:t>查看当前目录文件</a:t>
+            </a:r>
+            <a:r>
+              <a:rPr lang="zh-CN" altLang="en-US" dirty="0" smtClean="0"/>
+              <a:t>读写权限</a:t>
             </a:r>
             <a:endParaRPr lang="en-US" dirty="0" smtClean="0"/>
           </a:p>
@@ -25251,7 +25251,112 @@
             </a:r>
             <a:r>
               <a:rPr lang="zh-CN" altLang="en-US" dirty="0" smtClean="0"/>
-              <a:t>显示隐藏文件</a:t>
+              <a:t>显示当前目录隐藏文件</a:t>
+            </a:r>
+            <a:endParaRPr lang="en-US" altLang="zh-CN" dirty="0" smtClean="0"/>
+          </a:p>
+          <a:p>
+            <a:r>
+              <a:rPr lang="en-US" altLang="zh-CN" dirty="0"/>
+              <a:t>l</a:t>
+            </a:r>
+            <a:r>
+              <a:rPr lang="en-US" altLang="zh-CN" dirty="0" smtClean="0"/>
+              <a:t>s $HOME——</a:t>
+            </a:r>
+            <a:r>
+              <a:rPr lang="zh-CN" altLang="en-US" dirty="0" smtClean="0"/>
+              <a:t>查看</a:t>
+            </a:r>
+            <a:r>
+              <a:rPr lang="zh-CN" altLang="en-US" dirty="0"/>
+              <a:t>指定目录</a:t>
+            </a:r>
+            <a:r>
+              <a:rPr lang="en-US" altLang="zh-CN" dirty="0"/>
+              <a:t>HOME</a:t>
+            </a:r>
+            <a:r>
+              <a:rPr lang="zh-CN" altLang="en-US" dirty="0"/>
+              <a:t>中</a:t>
+            </a:r>
+            <a:r>
+              <a:rPr lang="zh-CN" altLang="en-US" dirty="0" smtClean="0"/>
+              <a:t>文件</a:t>
+            </a:r>
+            <a:r>
+              <a:rPr lang="zh-CN" altLang="en-US" dirty="0"/>
+              <a:t>列表</a:t>
+            </a:r>
+            <a:endParaRPr lang="en-US" altLang="zh-CN" dirty="0"/>
+          </a:p>
+          <a:p>
+            <a:r>
+              <a:rPr lang="en-US" altLang="zh-CN" dirty="0"/>
+              <a:t>ls </a:t>
+            </a:r>
+            <a:r>
+              <a:rPr lang="en-US" altLang="zh-CN"/>
+              <a:t>–</a:t>
+            </a:r>
+            <a:r>
+              <a:rPr lang="en-US" altLang="zh-CN" smtClean="0"/>
+              <a:t>l $HOME——</a:t>
+            </a:r>
+            <a:r>
+              <a:rPr lang="zh-CN" altLang="en-US" dirty="0" smtClean="0"/>
+              <a:t>查看</a:t>
+            </a:r>
+            <a:r>
+              <a:rPr lang="zh-CN" altLang="en-US" dirty="0"/>
+              <a:t>指定目录</a:t>
+            </a:r>
+            <a:r>
+              <a:rPr lang="en-US" altLang="zh-CN" dirty="0"/>
+              <a:t>HOME</a:t>
+            </a:r>
+            <a:r>
+              <a:rPr lang="zh-CN" altLang="en-US" dirty="0"/>
+              <a:t>中</a:t>
+            </a:r>
+            <a:r>
+              <a:rPr lang="zh-CN" altLang="en-US" dirty="0" smtClean="0"/>
+              <a:t>文件</a:t>
+            </a:r>
+            <a:r>
+              <a:rPr lang="zh-CN" altLang="en-US" dirty="0"/>
+              <a:t>读写权限</a:t>
+            </a:r>
+            <a:endParaRPr lang="en-US" altLang="zh-CN" dirty="0"/>
+          </a:p>
+          <a:p>
+            <a:r>
+              <a:rPr lang="en-US" altLang="zh-CN" dirty="0"/>
+              <a:t>ls –</a:t>
+            </a:r>
+            <a:r>
+              <a:rPr lang="en-US" altLang="zh-CN" dirty="0" smtClean="0"/>
+              <a:t>ah $HOME——</a:t>
+            </a:r>
+            <a:r>
+              <a:rPr lang="zh-CN" altLang="en-US" dirty="0" smtClean="0"/>
+              <a:t>显示</a:t>
+            </a:r>
+            <a:r>
+              <a:rPr lang="zh-CN" altLang="en-US" dirty="0"/>
+              <a:t>指定</a:t>
+            </a:r>
+            <a:r>
+              <a:rPr lang="zh-CN" altLang="en-US" dirty="0" smtClean="0"/>
+              <a:t>目录</a:t>
+            </a:r>
+            <a:r>
+              <a:rPr lang="en-US" altLang="zh-CN" dirty="0" smtClean="0"/>
+              <a:t>HOME</a:t>
+            </a:r>
+            <a:r>
+              <a:rPr lang="zh-CN" altLang="en-US" dirty="0" smtClean="0"/>
+              <a:t>中隐藏文件</a:t>
             </a:r>
             <a:endParaRPr lang="en-US" altLang="zh-CN" dirty="0" smtClean="0"/>
           </a:p>

</xml_diff>